<commit_message>
Added content to second lesson and some info to the readme
</commit_message>
<xml_diff>
--- a/Lessons/Lesson_2 - Syntax.pptx
+++ b/Lessons/Lesson_2 - Syntax.pptx
@@ -205,7 +205,7 @@
           <a:p>
             <a:fld id="{91EF4A8E-EF83-499A-8F71-263A2A48D38A}" type="datetimeFigureOut">
               <a:rPr lang="en-GB" smtClean="0"/>
-              <a:t>25/01/2023</a:t>
+              <a:t>01/02/2023</a:t>
             </a:fld>
             <a:endParaRPr lang="en-GB"/>
           </a:p>
@@ -975,7 +975,7 @@
           <a:p>
             <a:fld id="{73FFBB72-C876-443F-A7E7-9A53EEB050C7}" type="datetime1">
               <a:rPr lang="en-GB" smtClean="0"/>
-              <a:t>25/01/2023</a:t>
+              <a:t>01/02/2023</a:t>
             </a:fld>
             <a:endParaRPr lang="en-GB"/>
           </a:p>
@@ -1274,7 +1274,7 @@
           <a:p>
             <a:fld id="{7F20D145-B4C3-4BE4-95C4-801AC5C929CD}" type="datetime1">
               <a:rPr lang="en-GB" smtClean="0"/>
-              <a:t>25/01/2023</a:t>
+              <a:t>01/02/2023</a:t>
             </a:fld>
             <a:endParaRPr lang="en-GB"/>
           </a:p>
@@ -1525,7 +1525,7 @@
           <a:p>
             <a:fld id="{0F655E77-BFA6-4B0D-9E94-A1B849CFE5B9}" type="datetime1">
               <a:rPr lang="en-GB" smtClean="0"/>
-              <a:t>25/01/2023</a:t>
+              <a:t>01/02/2023</a:t>
             </a:fld>
             <a:endParaRPr lang="en-GB"/>
           </a:p>
@@ -2068,7 +2068,7 @@
           <a:p>
             <a:fld id="{625EA698-52F5-4D32-9986-ED3DAD0843E3}" type="datetime1">
               <a:rPr lang="en-GB" smtClean="0"/>
-              <a:t>25/01/2023</a:t>
+              <a:t>01/02/2023</a:t>
             </a:fld>
             <a:endParaRPr lang="en-GB"/>
           </a:p>
@@ -2319,7 +2319,7 @@
           <a:p>
             <a:fld id="{0B8D187A-C09D-4D27-91C1-811C216AA178}" type="datetime1">
               <a:rPr lang="en-GB" smtClean="0"/>
-              <a:t>25/01/2023</a:t>
+              <a:t>01/02/2023</a:t>
             </a:fld>
             <a:endParaRPr lang="en-GB"/>
           </a:p>
@@ -2854,7 +2854,7 @@
           <a:p>
             <a:fld id="{B0486FD7-E713-4687-974E-66B010EE9652}" type="datetime1">
               <a:rPr lang="en-GB" smtClean="0"/>
-              <a:t>25/01/2023</a:t>
+              <a:t>01/02/2023</a:t>
             </a:fld>
             <a:endParaRPr lang="en-GB"/>
           </a:p>
@@ -3154,7 +3154,7 @@
           <a:p>
             <a:fld id="{8E33251D-C6F0-444F-9935-2AFD610C3B8C}" type="datetime1">
               <a:rPr lang="en-GB" smtClean="0"/>
-              <a:t>25/01/2023</a:t>
+              <a:t>01/02/2023</a:t>
             </a:fld>
             <a:endParaRPr lang="en-GB"/>
           </a:p>
@@ -3331,7 +3331,7 @@
           <a:p>
             <a:fld id="{DE29223A-2F69-4C01-B788-5B7AEC86C6B1}" type="datetime1">
               <a:rPr lang="en-GB" smtClean="0"/>
-              <a:t>25/01/2023</a:t>
+              <a:t>01/02/2023</a:t>
             </a:fld>
             <a:endParaRPr lang="en-GB"/>
           </a:p>
@@ -3514,7 +3514,7 @@
           <a:p>
             <a:fld id="{59538135-7447-4CF2-A22B-DCB593D6CC80}" type="datetime1">
               <a:rPr lang="en-GB" smtClean="0"/>
-              <a:t>25/01/2023</a:t>
+              <a:t>01/02/2023</a:t>
             </a:fld>
             <a:endParaRPr lang="en-GB"/>
           </a:p>
@@ -3687,7 +3687,7 @@
           <a:p>
             <a:fld id="{5F8BECBC-3DB9-47B2-99FB-094A869A67E3}" type="datetime1">
               <a:rPr lang="en-GB" smtClean="0"/>
-              <a:t>25/01/2023</a:t>
+              <a:t>01/02/2023</a:t>
             </a:fld>
             <a:endParaRPr lang="en-GB"/>
           </a:p>
@@ -3941,7 +3941,7 @@
           <a:p>
             <a:fld id="{07584872-691E-4261-9A61-8BF7CB8B4943}" type="datetime1">
               <a:rPr lang="en-GB" smtClean="0"/>
-              <a:t>25/01/2023</a:t>
+              <a:t>01/02/2023</a:t>
             </a:fld>
             <a:endParaRPr lang="en-GB"/>
           </a:p>
@@ -4241,7 +4241,7 @@
           <a:p>
             <a:fld id="{6343392B-2E47-48FD-808A-BFCBA0962005}" type="datetime1">
               <a:rPr lang="en-GB" smtClean="0"/>
-              <a:t>25/01/2023</a:t>
+              <a:t>01/02/2023</a:t>
             </a:fld>
             <a:endParaRPr lang="en-GB"/>
           </a:p>
@@ -4686,7 +4686,7 @@
           <a:p>
             <a:fld id="{7BC3B8FA-7B86-481C-ABE0-9F8D658200A1}" type="datetime1">
               <a:rPr lang="en-GB" smtClean="0"/>
-              <a:t>25/01/2023</a:t>
+              <a:t>01/02/2023</a:t>
             </a:fld>
             <a:endParaRPr lang="en-GB"/>
           </a:p>
@@ -4807,7 +4807,7 @@
           <a:p>
             <a:fld id="{3C051C5E-7C4A-4228-BD8F-A930CDDA5A22}" type="datetime1">
               <a:rPr lang="en-GB" smtClean="0"/>
-              <a:t>25/01/2023</a:t>
+              <a:t>01/02/2023</a:t>
             </a:fld>
             <a:endParaRPr lang="en-GB"/>
           </a:p>
@@ -4905,7 +4905,7 @@
           <a:p>
             <a:fld id="{671E384B-2D39-4425-860A-E6D5B82FC26B}" type="datetime1">
               <a:rPr lang="en-GB" smtClean="0"/>
-              <a:t>25/01/2023</a:t>
+              <a:t>01/02/2023</a:t>
             </a:fld>
             <a:endParaRPr lang="en-GB"/>
           </a:p>
@@ -5191,7 +5191,7 @@
           <a:p>
             <a:fld id="{94838649-0547-4C71-ACAB-753F0C5DE7F8}" type="datetime1">
               <a:rPr lang="en-GB" smtClean="0"/>
-              <a:t>25/01/2023</a:t>
+              <a:t>01/02/2023</a:t>
             </a:fld>
             <a:endParaRPr lang="en-GB"/>
           </a:p>
@@ -5485,7 +5485,7 @@
           <a:p>
             <a:fld id="{359ADDAD-9091-425D-BAEE-F5797E852C44}" type="datetime1">
               <a:rPr lang="en-GB" smtClean="0"/>
-              <a:t>25/01/2023</a:t>
+              <a:t>01/02/2023</a:t>
             </a:fld>
             <a:endParaRPr lang="en-GB"/>
           </a:p>
@@ -6018,7 +6018,7 @@
           <a:p>
             <a:fld id="{961DBF95-BDB3-4610-A7CE-9A3D2789461A}" type="datetime1">
               <a:rPr lang="en-GB" smtClean="0"/>
-              <a:t>25/01/2023</a:t>
+              <a:t>01/02/2023</a:t>
             </a:fld>
             <a:endParaRPr lang="en-GB"/>
           </a:p>
@@ -7331,6 +7331,8 @@
                     </a:srgbClr>
                   </a:outerShdw>
                 </a:effectLst>
+                <a:latin typeface="Calibri" panose="020F0502020204030204" pitchFamily="34" charset="0"/>
+                <a:cs typeface="Calibri" panose="020F0502020204030204" pitchFamily="34" charset="0"/>
               </a:rPr>
               <a:t>Syntax</a:t>
             </a:r>
@@ -7353,6 +7355,8 @@
                     </a:srgbClr>
                   </a:outerShdw>
                 </a:effectLst>
+                <a:latin typeface="Calibri" panose="020F0502020204030204" pitchFamily="34" charset="0"/>
+                <a:cs typeface="Calibri" panose="020F0502020204030204" pitchFamily="34" charset="0"/>
               </a:rPr>
               <a:t>Variable</a:t>
             </a:r>
@@ -7375,6 +7379,8 @@
                     </a:srgbClr>
                   </a:outerShdw>
                 </a:effectLst>
+                <a:latin typeface="Calibri" panose="020F0502020204030204" pitchFamily="34" charset="0"/>
+                <a:cs typeface="Calibri" panose="020F0502020204030204" pitchFamily="34" charset="0"/>
               </a:rPr>
               <a:t>Datatypes</a:t>
             </a:r>
@@ -7569,8 +7575,8 @@
         </p:nvSpPr>
         <p:spPr>
           <a:xfrm>
-            <a:off x="5016221" y="106440"/>
-            <a:ext cx="2159567" cy="923330"/>
+            <a:off x="5088805" y="106440"/>
+            <a:ext cx="2014398" cy="923330"/>
           </a:xfrm>
           <a:prstGeom prst="rect">
             <a:avLst/>
@@ -7597,6 +7603,8 @@
                     </a:schemeClr>
                   </a:outerShdw>
                 </a:effectLst>
+                <a:latin typeface="Calibri" panose="020F0502020204030204" pitchFamily="34" charset="0"/>
+                <a:cs typeface="Calibri" panose="020F0502020204030204" pitchFamily="34" charset="0"/>
               </a:rPr>
               <a:t>Syntax</a:t>
             </a:r>
@@ -7881,6 +7889,8 @@
                   <a:schemeClr val="accent4"/>
                 </a:solidFill>
                 <a:effectLst/>
+                <a:latin typeface="Calibri" panose="020F0502020204030204" pitchFamily="34" charset="0"/>
+                <a:cs typeface="Calibri" panose="020F0502020204030204" pitchFamily="34" charset="0"/>
               </a:rPr>
               <a:t>def</a:t>
             </a:r>
@@ -7931,6 +7941,8 @@
                 <a:solidFill>
                   <a:schemeClr val="accent4"/>
                 </a:solidFill>
+                <a:latin typeface="Calibri" panose="020F0502020204030204" pitchFamily="34" charset="0"/>
+                <a:cs typeface="Calibri" panose="020F0502020204030204" pitchFamily="34" charset="0"/>
               </a:rPr>
               <a:t>if</a:t>
             </a:r>
@@ -7940,6 +7952,8 @@
                 <a:schemeClr val="accent4"/>
               </a:solidFill>
               <a:effectLst/>
+              <a:latin typeface="Calibri" panose="020F0502020204030204" pitchFamily="34" charset="0"/>
+              <a:cs typeface="Calibri" panose="020F0502020204030204" pitchFamily="34" charset="0"/>
             </a:endParaRPr>
           </a:p>
         </p:txBody>
@@ -7989,6 +8003,8 @@
                   <a:schemeClr val="accent4"/>
                 </a:solidFill>
                 <a:effectLst/>
+                <a:latin typeface="Calibri" panose="020F0502020204030204" pitchFamily="34" charset="0"/>
+                <a:cs typeface="Calibri" panose="020F0502020204030204" pitchFamily="34" charset="0"/>
               </a:rPr>
               <a:t>elif</a:t>
             </a:r>
@@ -7998,6 +8014,8 @@
                 <a:schemeClr val="accent4"/>
               </a:solidFill>
               <a:effectLst/>
+              <a:latin typeface="Calibri" panose="020F0502020204030204" pitchFamily="34" charset="0"/>
+              <a:cs typeface="Calibri" panose="020F0502020204030204" pitchFamily="34" charset="0"/>
             </a:endParaRPr>
           </a:p>
         </p:txBody>
@@ -8047,6 +8065,8 @@
                   <a:schemeClr val="accent4"/>
                 </a:solidFill>
                 <a:effectLst/>
+                <a:latin typeface="Calibri" panose="020F0502020204030204" pitchFamily="34" charset="0"/>
+                <a:cs typeface="Calibri" panose="020F0502020204030204" pitchFamily="34" charset="0"/>
               </a:rPr>
               <a:t>else</a:t>
             </a:r>
@@ -8124,8 +8144,8 @@
         </p:nvSpPr>
         <p:spPr>
           <a:xfrm rot="1298962">
-            <a:off x="9226713" y="1728953"/>
-            <a:ext cx="1606530" cy="923330"/>
+            <a:off x="9261178" y="1728953"/>
+            <a:ext cx="1537600" cy="923330"/>
           </a:xfrm>
           <a:prstGeom prst="rect">
             <a:avLst/>
@@ -8154,6 +8174,8 @@
                 <a:solidFill>
                   <a:schemeClr val="accent4"/>
                 </a:solidFill>
+                <a:latin typeface="Calibri" panose="020F0502020204030204" pitchFamily="34" charset="0"/>
+                <a:cs typeface="Calibri" panose="020F0502020204030204" pitchFamily="34" charset="0"/>
               </a:rPr>
               <a:t>class</a:t>
             </a:r>
@@ -8163,6 +8185,8 @@
                 <a:schemeClr val="accent4"/>
               </a:solidFill>
               <a:effectLst/>
+              <a:latin typeface="Calibri" panose="020F0502020204030204" pitchFamily="34" charset="0"/>
+              <a:cs typeface="Calibri" panose="020F0502020204030204" pitchFamily="34" charset="0"/>
             </a:endParaRPr>
           </a:p>
         </p:txBody>
@@ -8211,6 +8235,8 @@
                 <a:solidFill>
                   <a:schemeClr val="accent4"/>
                 </a:solidFill>
+                <a:latin typeface="Calibri" panose="020F0502020204030204" pitchFamily="34" charset="0"/>
+                <a:cs typeface="Calibri" panose="020F0502020204030204" pitchFamily="34" charset="0"/>
               </a:rPr>
               <a:t>return</a:t>
             </a:r>
@@ -8220,6 +8246,8 @@
                 <a:schemeClr val="accent4"/>
               </a:solidFill>
               <a:effectLst/>
+              <a:latin typeface="Calibri" panose="020F0502020204030204" pitchFamily="34" charset="0"/>
+              <a:cs typeface="Calibri" panose="020F0502020204030204" pitchFamily="34" charset="0"/>
             </a:endParaRPr>
           </a:p>
         </p:txBody>
@@ -9293,6 +9321,8 @@
                     </a:schemeClr>
                   </a:outerShdw>
                 </a:effectLst>
+                <a:latin typeface="Calibri" panose="020F0502020204030204" pitchFamily="34" charset="0"/>
+                <a:cs typeface="Calibri" panose="020F0502020204030204" pitchFamily="34" charset="0"/>
               </a:rPr>
               <a:t>Variable</a:t>
             </a:r>
@@ -9511,8 +9541,8 @@
         </p:nvSpPr>
         <p:spPr>
           <a:xfrm>
-            <a:off x="4413495" y="106440"/>
-            <a:ext cx="3365024" cy="923330"/>
+            <a:off x="4481046" y="106440"/>
+            <a:ext cx="3229922" cy="923330"/>
           </a:xfrm>
           <a:prstGeom prst="rect">
             <a:avLst/>
@@ -9539,6 +9569,8 @@
                     </a:schemeClr>
                   </a:outerShdw>
                 </a:effectLst>
+                <a:latin typeface="Calibri" panose="020F0502020204030204" pitchFamily="34" charset="0"/>
+                <a:cs typeface="Calibri" panose="020F0502020204030204" pitchFamily="34" charset="0"/>
               </a:rPr>
               <a:t>Data-types</a:t>
             </a:r>
@@ -9593,6 +9625,246 @@
           </a:p>
         </p:txBody>
       </p:sp>
+      <p:sp>
+        <p:nvSpPr>
+          <p:cNvPr id="2" name="Rectangle 1">
+            <a:extLst>
+              <a:ext uri="{FF2B5EF4-FFF2-40B4-BE49-F238E27FC236}">
+                <a16:creationId xmlns:a16="http://schemas.microsoft.com/office/drawing/2014/main" id="{49A7E019-0C1A-7C96-24E4-5B170EDECD23}"/>
+              </a:ext>
+            </a:extLst>
+          </p:cNvPr>
+          <p:cNvSpPr/>
+          <p:nvPr/>
+        </p:nvSpPr>
+        <p:spPr>
+          <a:xfrm>
+            <a:off x="5197141" y="1779606"/>
+            <a:ext cx="2014911" cy="584775"/>
+          </a:xfrm>
+          <a:prstGeom prst="rect">
+            <a:avLst/>
+          </a:prstGeom>
+          <a:noFill/>
+        </p:spPr>
+        <p:txBody>
+          <a:bodyPr wrap="none" lIns="91440" tIns="45720" rIns="91440" bIns="45720">
+            <a:spAutoFit/>
+          </a:bodyPr>
+          <a:lstStyle/>
+          <a:p>
+            <a:pPr algn="just"/>
+            <a:r>
+              <a:rPr lang="en-US" sz="3200" b="0" cap="none" spc="0" dirty="0">
+                <a:ln w="0"/>
+                <a:solidFill>
+                  <a:schemeClr val="accent1"/>
+                </a:solidFill>
+                <a:effectLst>
+                  <a:outerShdw blurRad="38100" dist="25400" dir="5400000" algn="ctr" rotWithShape="0">
+                    <a:srgbClr val="6E747A">
+                      <a:alpha val="43000"/>
+                    </a:srgbClr>
+                  </a:outerShdw>
+                </a:effectLst>
+                <a:latin typeface="Calibri" panose="020F0502020204030204" pitchFamily="34" charset="0"/>
+                <a:cs typeface="Calibri" panose="020F0502020204030204" pitchFamily="34" charset="0"/>
+              </a:rPr>
+              <a:t>Two words</a:t>
+            </a:r>
+          </a:p>
+        </p:txBody>
+      </p:sp>
+      <p:sp>
+        <p:nvSpPr>
+          <p:cNvPr id="3" name="Rectangle 2">
+            <a:extLst>
+              <a:ext uri="{FF2B5EF4-FFF2-40B4-BE49-F238E27FC236}">
+                <a16:creationId xmlns:a16="http://schemas.microsoft.com/office/drawing/2014/main" id="{658A8139-B000-492A-9851-4233CABDE439}"/>
+              </a:ext>
+            </a:extLst>
+          </p:cNvPr>
+          <p:cNvSpPr/>
+          <p:nvPr/>
+        </p:nvSpPr>
+        <p:spPr>
+          <a:xfrm>
+            <a:off x="5203084" y="2878949"/>
+            <a:ext cx="2470548" cy="584775"/>
+          </a:xfrm>
+          <a:prstGeom prst="rect">
+            <a:avLst/>
+          </a:prstGeom>
+          <a:noFill/>
+        </p:spPr>
+        <p:txBody>
+          <a:bodyPr wrap="none" lIns="91440" tIns="45720" rIns="91440" bIns="45720">
+            <a:spAutoFit/>
+          </a:bodyPr>
+          <a:lstStyle/>
+          <a:p>
+            <a:pPr algn="just"/>
+            <a:r>
+              <a:rPr lang="en-US" sz="3200" b="0" cap="none" spc="0" dirty="0">
+                <a:ln w="0"/>
+                <a:solidFill>
+                  <a:schemeClr val="accent1"/>
+                </a:solidFill>
+                <a:effectLst>
+                  <a:outerShdw blurRad="38100" dist="25400" dir="5400000" algn="ctr" rotWithShape="0">
+                    <a:srgbClr val="6E747A">
+                      <a:alpha val="43000"/>
+                    </a:srgbClr>
+                  </a:outerShdw>
+                </a:effectLst>
+                <a:latin typeface="Calibri" panose="020F0502020204030204" pitchFamily="34" charset="0"/>
+                <a:cs typeface="Calibri" panose="020F0502020204030204" pitchFamily="34" charset="0"/>
+              </a:rPr>
+              <a:t>What is data?</a:t>
+            </a:r>
+          </a:p>
+        </p:txBody>
+      </p:sp>
+      <p:sp>
+        <p:nvSpPr>
+          <p:cNvPr id="6" name="Rectangle 5">
+            <a:extLst>
+              <a:ext uri="{FF2B5EF4-FFF2-40B4-BE49-F238E27FC236}">
+                <a16:creationId xmlns:a16="http://schemas.microsoft.com/office/drawing/2014/main" id="{0FA0A9D9-38B2-A2EC-11B9-61CB1EE8E66A}"/>
+              </a:ext>
+            </a:extLst>
+          </p:cNvPr>
+          <p:cNvSpPr/>
+          <p:nvPr/>
+        </p:nvSpPr>
+        <p:spPr>
+          <a:xfrm>
+            <a:off x="5290447" y="3966884"/>
+            <a:ext cx="5067413" cy="584775"/>
+          </a:xfrm>
+          <a:prstGeom prst="rect">
+            <a:avLst/>
+          </a:prstGeom>
+          <a:noFill/>
+        </p:spPr>
+        <p:txBody>
+          <a:bodyPr wrap="none" lIns="91440" tIns="45720" rIns="91440" bIns="45720">
+            <a:spAutoFit/>
+          </a:bodyPr>
+          <a:lstStyle/>
+          <a:p>
+            <a:pPr algn="just"/>
+            <a:r>
+              <a:rPr lang="en-US" sz="3200" b="0" cap="none" spc="0" dirty="0">
+                <a:ln w="0"/>
+                <a:solidFill>
+                  <a:schemeClr val="accent1"/>
+                </a:solidFill>
+                <a:effectLst>
+                  <a:outerShdw blurRad="38100" dist="25400" dir="5400000" algn="ctr" rotWithShape="0">
+                    <a:srgbClr val="6E747A">
+                      <a:alpha val="43000"/>
+                    </a:srgbClr>
+                  </a:outerShdw>
+                </a:effectLst>
+                <a:latin typeface="Calibri" panose="020F0502020204030204" pitchFamily="34" charset="0"/>
+                <a:cs typeface="Calibri" panose="020F0502020204030204" pitchFamily="34" charset="0"/>
+              </a:rPr>
+              <a:t>What types can you think of?</a:t>
+            </a:r>
+          </a:p>
+        </p:txBody>
+      </p:sp>
+      <p:cxnSp>
+        <p:nvCxnSpPr>
+          <p:cNvPr id="9" name="Straight Arrow Connector 8">
+            <a:extLst>
+              <a:ext uri="{FF2B5EF4-FFF2-40B4-BE49-F238E27FC236}">
+                <a16:creationId xmlns:a16="http://schemas.microsoft.com/office/drawing/2014/main" id="{8D014F61-70B2-9BC4-2AA8-A006B7B5480F}"/>
+              </a:ext>
+            </a:extLst>
+          </p:cNvPr>
+          <p:cNvCxnSpPr/>
+          <p:nvPr/>
+        </p:nvCxnSpPr>
+        <p:spPr>
+          <a:xfrm flipH="1" flipV="1">
+            <a:off x="5290447" y="1029770"/>
+            <a:ext cx="388786" cy="761244"/>
+          </a:xfrm>
+          <a:prstGeom prst="straightConnector1">
+            <a:avLst/>
+          </a:prstGeom>
+          <a:ln w="76200">
+            <a:solidFill>
+              <a:schemeClr val="accent1">
+                <a:lumMod val="50000"/>
+              </a:schemeClr>
+            </a:solidFill>
+            <a:tailEnd type="triangle"/>
+          </a:ln>
+        </p:spPr>
+        <p:style>
+          <a:lnRef idx="1">
+            <a:schemeClr val="accent1"/>
+          </a:lnRef>
+          <a:fillRef idx="0">
+            <a:schemeClr val="accent1"/>
+          </a:fillRef>
+          <a:effectRef idx="0">
+            <a:schemeClr val="accent1"/>
+          </a:effectRef>
+          <a:fontRef idx="minor">
+            <a:schemeClr val="tx1"/>
+          </a:fontRef>
+        </p:style>
+      </p:cxnSp>
+      <p:cxnSp>
+        <p:nvCxnSpPr>
+          <p:cNvPr id="10" name="Straight Arrow Connector 9">
+            <a:extLst>
+              <a:ext uri="{FF2B5EF4-FFF2-40B4-BE49-F238E27FC236}">
+                <a16:creationId xmlns:a16="http://schemas.microsoft.com/office/drawing/2014/main" id="{8F8F8D2A-A34B-1B92-DC54-58A5B0241768}"/>
+              </a:ext>
+            </a:extLst>
+          </p:cNvPr>
+          <p:cNvCxnSpPr>
+            <a:cxnSpLocks/>
+          </p:cNvCxnSpPr>
+          <p:nvPr/>
+        </p:nvCxnSpPr>
+        <p:spPr>
+          <a:xfrm flipV="1">
+            <a:off x="6658059" y="1029770"/>
+            <a:ext cx="234153" cy="761244"/>
+          </a:xfrm>
+          <a:prstGeom prst="straightConnector1">
+            <a:avLst/>
+          </a:prstGeom>
+          <a:ln w="76200">
+            <a:solidFill>
+              <a:schemeClr val="accent1">
+                <a:lumMod val="50000"/>
+              </a:schemeClr>
+            </a:solidFill>
+            <a:tailEnd type="triangle"/>
+          </a:ln>
+        </p:spPr>
+        <p:style>
+          <a:lnRef idx="1">
+            <a:schemeClr val="accent1"/>
+          </a:lnRef>
+          <a:fillRef idx="0">
+            <a:schemeClr val="accent1"/>
+          </a:fillRef>
+          <a:effectRef idx="0">
+            <a:schemeClr val="accent1"/>
+          </a:effectRef>
+          <a:fontRef idx="minor">
+            <a:schemeClr val="tx1"/>
+          </a:fontRef>
+        </p:style>
+      </p:cxnSp>
     </p:spTree>
     <p:extLst>
       <p:ext uri="{BB962C8B-B14F-4D97-AF65-F5344CB8AC3E}">
@@ -9603,6 +9875,251 @@
   <p:clrMapOvr>
     <a:masterClrMapping/>
   </p:clrMapOvr>
+  <p:timing>
+    <p:tnLst>
+      <p:par>
+        <p:cTn id="1" dur="indefinite" restart="never" nodeType="tmRoot">
+          <p:childTnLst>
+            <p:seq concurrent="1" nextAc="seek">
+              <p:cTn id="2" dur="indefinite" nodeType="mainSeq">
+                <p:childTnLst>
+                  <p:par>
+                    <p:cTn id="3" fill="hold">
+                      <p:stCondLst>
+                        <p:cond delay="indefinite"/>
+                      </p:stCondLst>
+                      <p:childTnLst>
+                        <p:par>
+                          <p:cTn id="4" fill="hold">
+                            <p:stCondLst>
+                              <p:cond delay="0"/>
+                            </p:stCondLst>
+                            <p:childTnLst>
+                              <p:par>
+                                <p:cTn id="5" presetID="1" presetClass="entr" presetSubtype="0" fill="hold" grpId="0" nodeType="clickEffect">
+                                  <p:stCondLst>
+                                    <p:cond delay="0"/>
+                                  </p:stCondLst>
+                                  <p:childTnLst>
+                                    <p:set>
+                                      <p:cBhvr>
+                                        <p:cTn id="6" dur="1" fill="hold">
+                                          <p:stCondLst>
+                                            <p:cond delay="0"/>
+                                          </p:stCondLst>
+                                        </p:cTn>
+                                        <p:tgtEl>
+                                          <p:spTgt spid="2"/>
+                                        </p:tgtEl>
+                                        <p:attrNameLst>
+                                          <p:attrName>style.visibility</p:attrName>
+                                        </p:attrNameLst>
+                                      </p:cBhvr>
+                                      <p:to>
+                                        <p:strVal val="visible"/>
+                                      </p:to>
+                                    </p:set>
+                                  </p:childTnLst>
+                                </p:cTn>
+                              </p:par>
+                            </p:childTnLst>
+                          </p:cTn>
+                        </p:par>
+                      </p:childTnLst>
+                    </p:cTn>
+                  </p:par>
+                  <p:par>
+                    <p:cTn id="7" fill="hold">
+                      <p:stCondLst>
+                        <p:cond delay="indefinite"/>
+                      </p:stCondLst>
+                      <p:childTnLst>
+                        <p:par>
+                          <p:cTn id="8" fill="hold">
+                            <p:stCondLst>
+                              <p:cond delay="0"/>
+                            </p:stCondLst>
+                            <p:childTnLst>
+                              <p:par>
+                                <p:cTn id="9" presetID="1" presetClass="entr" presetSubtype="0" fill="hold" nodeType="clickEffect">
+                                  <p:stCondLst>
+                                    <p:cond delay="0"/>
+                                  </p:stCondLst>
+                                  <p:childTnLst>
+                                    <p:set>
+                                      <p:cBhvr>
+                                        <p:cTn id="10" dur="1" fill="hold">
+                                          <p:stCondLst>
+                                            <p:cond delay="0"/>
+                                          </p:stCondLst>
+                                        </p:cTn>
+                                        <p:tgtEl>
+                                          <p:spTgt spid="9"/>
+                                        </p:tgtEl>
+                                        <p:attrNameLst>
+                                          <p:attrName>style.visibility</p:attrName>
+                                        </p:attrNameLst>
+                                      </p:cBhvr>
+                                      <p:to>
+                                        <p:strVal val="visible"/>
+                                      </p:to>
+                                    </p:set>
+                                  </p:childTnLst>
+                                </p:cTn>
+                              </p:par>
+                              <p:par>
+                                <p:cTn id="11" presetID="1" presetClass="entr" presetSubtype="0" fill="hold" nodeType="withEffect">
+                                  <p:stCondLst>
+                                    <p:cond delay="0"/>
+                                  </p:stCondLst>
+                                  <p:childTnLst>
+                                    <p:set>
+                                      <p:cBhvr>
+                                        <p:cTn id="12" dur="1" fill="hold">
+                                          <p:stCondLst>
+                                            <p:cond delay="0"/>
+                                          </p:stCondLst>
+                                        </p:cTn>
+                                        <p:tgtEl>
+                                          <p:spTgt spid="10"/>
+                                        </p:tgtEl>
+                                        <p:attrNameLst>
+                                          <p:attrName>style.visibility</p:attrName>
+                                        </p:attrNameLst>
+                                      </p:cBhvr>
+                                      <p:to>
+                                        <p:strVal val="visible"/>
+                                      </p:to>
+                                    </p:set>
+                                  </p:childTnLst>
+                                </p:cTn>
+                              </p:par>
+                            </p:childTnLst>
+                          </p:cTn>
+                        </p:par>
+                      </p:childTnLst>
+                    </p:cTn>
+                  </p:par>
+                  <p:par>
+                    <p:cTn id="13" fill="hold">
+                      <p:stCondLst>
+                        <p:cond delay="indefinite"/>
+                      </p:stCondLst>
+                      <p:childTnLst>
+                        <p:par>
+                          <p:cTn id="14" fill="hold">
+                            <p:stCondLst>
+                              <p:cond delay="0"/>
+                            </p:stCondLst>
+                            <p:childTnLst>
+                              <p:par>
+                                <p:cTn id="15" presetID="1" presetClass="entr" presetSubtype="0" fill="hold" nodeType="clickEffect">
+                                  <p:stCondLst>
+                                    <p:cond delay="0"/>
+                                  </p:stCondLst>
+                                  <p:childTnLst>
+                                    <p:set>
+                                      <p:cBhvr>
+                                        <p:cTn id="16" dur="1" fill="hold">
+                                          <p:stCondLst>
+                                            <p:cond delay="0"/>
+                                          </p:stCondLst>
+                                        </p:cTn>
+                                        <p:tgtEl>
+                                          <p:spTgt spid="3">
+                                            <p:txEl>
+                                              <p:pRg st="0" end="0"/>
+                                            </p:txEl>
+                                          </p:spTgt>
+                                        </p:tgtEl>
+                                        <p:attrNameLst>
+                                          <p:attrName>style.visibility</p:attrName>
+                                        </p:attrNameLst>
+                                      </p:cBhvr>
+                                      <p:to>
+                                        <p:strVal val="visible"/>
+                                      </p:to>
+                                    </p:set>
+                                  </p:childTnLst>
+                                </p:cTn>
+                              </p:par>
+                            </p:childTnLst>
+                          </p:cTn>
+                        </p:par>
+                      </p:childTnLst>
+                    </p:cTn>
+                  </p:par>
+                  <p:par>
+                    <p:cTn id="17" fill="hold">
+                      <p:stCondLst>
+                        <p:cond delay="indefinite"/>
+                      </p:stCondLst>
+                      <p:childTnLst>
+                        <p:par>
+                          <p:cTn id="18" fill="hold">
+                            <p:stCondLst>
+                              <p:cond delay="0"/>
+                            </p:stCondLst>
+                            <p:childTnLst>
+                              <p:par>
+                                <p:cTn id="19" presetID="1" presetClass="entr" presetSubtype="0" fill="hold" grpId="0" nodeType="clickEffect">
+                                  <p:stCondLst>
+                                    <p:cond delay="0"/>
+                                  </p:stCondLst>
+                                  <p:childTnLst>
+                                    <p:set>
+                                      <p:cBhvr>
+                                        <p:cTn id="20" dur="1" fill="hold">
+                                          <p:stCondLst>
+                                            <p:cond delay="0"/>
+                                          </p:stCondLst>
+                                        </p:cTn>
+                                        <p:tgtEl>
+                                          <p:spTgt spid="6"/>
+                                        </p:tgtEl>
+                                        <p:attrNameLst>
+                                          <p:attrName>style.visibility</p:attrName>
+                                        </p:attrNameLst>
+                                      </p:cBhvr>
+                                      <p:to>
+                                        <p:strVal val="visible"/>
+                                      </p:to>
+                                    </p:set>
+                                  </p:childTnLst>
+                                </p:cTn>
+                              </p:par>
+                            </p:childTnLst>
+                          </p:cTn>
+                        </p:par>
+                      </p:childTnLst>
+                    </p:cTn>
+                  </p:par>
+                </p:childTnLst>
+              </p:cTn>
+              <p:prevCondLst>
+                <p:cond evt="onPrev" delay="0">
+                  <p:tgtEl>
+                    <p:sldTgt/>
+                  </p:tgtEl>
+                </p:cond>
+              </p:prevCondLst>
+              <p:nextCondLst>
+                <p:cond evt="onNext" delay="0">
+                  <p:tgtEl>
+                    <p:sldTgt/>
+                  </p:tgtEl>
+                </p:cond>
+              </p:nextCondLst>
+            </p:seq>
+          </p:childTnLst>
+        </p:cTn>
+      </p:par>
+    </p:tnLst>
+    <p:bldLst>
+      <p:bldP spid="2" grpId="0"/>
+      <p:bldP spid="6" grpId="0"/>
+    </p:bldLst>
+  </p:timing>
 </p:sld>
 </file>
 
@@ -9685,7 +10202,7 @@
         </p:nvSpPr>
         <p:spPr>
           <a:xfrm>
-            <a:off x="4976149" y="106440"/>
+            <a:off x="5542206" y="1976761"/>
             <a:ext cx="2239716" cy="923330"/>
           </a:xfrm>
           <a:prstGeom prst="rect">
@@ -9710,6 +10227,8 @@
                     </a:schemeClr>
                   </a:outerShdw>
                 </a:effectLst>
+                <a:latin typeface="Calibri" panose="020F0502020204030204" pitchFamily="34" charset="0"/>
+                <a:cs typeface="Calibri" panose="020F0502020204030204" pitchFamily="34" charset="0"/>
               </a:rPr>
               <a:t>integer</a:t>
             </a:r>
@@ -9725,166 +10244,8 @@
                   </a:schemeClr>
                 </a:outerShdw>
               </a:effectLst>
-            </a:endParaRPr>
-          </a:p>
-        </p:txBody>
-      </p:sp>
-      <p:sp>
-        <p:nvSpPr>
-          <p:cNvPr id="7" name="Rectangle 6">
-            <a:extLst>
-              <a:ext uri="{FF2B5EF4-FFF2-40B4-BE49-F238E27FC236}">
-                <a16:creationId xmlns:a16="http://schemas.microsoft.com/office/drawing/2014/main" id="{A31FD0FC-4D73-191F-70CF-EEAAEFB26936}"/>
-              </a:ext>
-            </a:extLst>
-          </p:cNvPr>
-          <p:cNvSpPr/>
-          <p:nvPr/>
-        </p:nvSpPr>
-        <p:spPr>
-          <a:xfrm>
-            <a:off x="4942485" y="1905506"/>
-            <a:ext cx="5646867" cy="3046988"/>
-          </a:xfrm>
-          <a:prstGeom prst="rect">
-            <a:avLst/>
-          </a:prstGeom>
-          <a:noFill/>
-        </p:spPr>
-        <p:txBody>
-          <a:bodyPr wrap="none" lIns="91440" tIns="45720" rIns="91440" bIns="45720">
-            <a:spAutoFit/>
-          </a:bodyPr>
-          <a:lstStyle/>
-          <a:p>
-            <a:pPr marL="685800" indent="-685800" algn="just">
-              <a:buFont typeface="Arial" panose="020B0604020202020204" pitchFamily="34" charset="0"/>
-              <a:buChar char="•"/>
-            </a:pPr>
-            <a:r>
-              <a:rPr lang="en-US" sz="3200" b="0" cap="none" spc="0" dirty="0">
-                <a:ln w="0"/>
-                <a:solidFill>
-                  <a:schemeClr val="accent1"/>
-                </a:solidFill>
-                <a:effectLst>
-                  <a:outerShdw blurRad="38100" dist="25400" dir="5400000" algn="ctr" rotWithShape="0">
-                    <a:srgbClr val="6E747A">
-                      <a:alpha val="43000"/>
-                    </a:srgbClr>
-                  </a:outerShdw>
-                </a:effectLst>
-              </a:rPr>
-              <a:t>Syntax ; Variable ; Language</a:t>
-            </a:r>
-          </a:p>
-          <a:p>
-            <a:pPr marL="685800" indent="-685800" algn="just">
-              <a:buFont typeface="Arial" panose="020B0604020202020204" pitchFamily="34" charset="0"/>
-              <a:buChar char="•"/>
-            </a:pPr>
-            <a:r>
-              <a:rPr lang="en-US" sz="3200" dirty="0">
-                <a:ln w="0"/>
-                <a:solidFill>
-                  <a:schemeClr val="accent1"/>
-                </a:solidFill>
-                <a:effectLst>
-                  <a:outerShdw blurRad="38100" dist="25400" dir="5400000" algn="ctr" rotWithShape="0">
-                    <a:srgbClr val="6E747A">
-                      <a:alpha val="43000"/>
-                    </a:srgbClr>
-                  </a:outerShdw>
-                </a:effectLst>
-              </a:rPr>
-              <a:t>Expressions</a:t>
-            </a:r>
-          </a:p>
-          <a:p>
-            <a:pPr marL="685800" indent="-685800" algn="just">
-              <a:buFont typeface="Arial" panose="020B0604020202020204" pitchFamily="34" charset="0"/>
-              <a:buChar char="•"/>
-            </a:pPr>
-            <a:r>
-              <a:rPr lang="en-US" sz="3200" b="0" cap="none" spc="0" dirty="0">
-                <a:ln w="0"/>
-                <a:solidFill>
-                  <a:schemeClr val="accent1"/>
-                </a:solidFill>
-                <a:effectLst>
-                  <a:outerShdw blurRad="38100" dist="25400" dir="5400000" algn="ctr" rotWithShape="0">
-                    <a:srgbClr val="6E747A">
-                      <a:alpha val="43000"/>
-                    </a:srgbClr>
-                  </a:outerShdw>
-                </a:effectLst>
-              </a:rPr>
-              <a:t>If else conditions</a:t>
-            </a:r>
-          </a:p>
-          <a:p>
-            <a:pPr marL="685800" indent="-685800" algn="just">
-              <a:buFont typeface="Arial" panose="020B0604020202020204" pitchFamily="34" charset="0"/>
-              <a:buChar char="•"/>
-            </a:pPr>
-            <a:r>
-              <a:rPr lang="en-US" sz="3200" dirty="0">
-                <a:ln w="0"/>
-                <a:solidFill>
-                  <a:schemeClr val="accent1"/>
-                </a:solidFill>
-                <a:effectLst>
-                  <a:outerShdw blurRad="38100" dist="25400" dir="5400000" algn="ctr" rotWithShape="0">
-                    <a:srgbClr val="6E747A">
-                      <a:alpha val="43000"/>
-                    </a:srgbClr>
-                  </a:outerShdw>
-                </a:effectLst>
-              </a:rPr>
-              <a:t>For while do while loops</a:t>
-            </a:r>
-          </a:p>
-          <a:p>
-            <a:pPr marL="685800" indent="-685800" algn="just">
-              <a:buFont typeface="Arial" panose="020B0604020202020204" pitchFamily="34" charset="0"/>
-              <a:buChar char="•"/>
-            </a:pPr>
-            <a:r>
-              <a:rPr lang="en-US" sz="3200" b="0" cap="none" spc="0" dirty="0">
-                <a:ln w="0"/>
-                <a:solidFill>
-                  <a:schemeClr val="accent3">
-                    <a:lumMod val="75000"/>
-                  </a:schemeClr>
-                </a:solidFill>
-                <a:effectLst>
-                  <a:outerShdw blurRad="38100" dist="25400" dir="5400000" algn="ctr" rotWithShape="0">
-                    <a:srgbClr val="6E747A">
-                      <a:alpha val="43000"/>
-                    </a:srgbClr>
-                  </a:outerShdw>
-                </a:effectLst>
-              </a:rPr>
-              <a:t>Guess Number Game</a:t>
-            </a:r>
-          </a:p>
-          <a:p>
-            <a:pPr marL="685800" indent="-685800" algn="just">
-              <a:buFont typeface="Arial" panose="020B0604020202020204" pitchFamily="34" charset="0"/>
-              <a:buChar char="•"/>
-            </a:pPr>
-            <a:endParaRPr lang="en-US" sz="3200" b="0" cap="none" spc="0" dirty="0">
-              <a:ln w="0"/>
-              <a:solidFill>
-                <a:schemeClr val="accent1"/>
-              </a:solidFill>
-              <a:effectLst>
-                <a:outerShdw blurRad="38100" dist="25400" dir="5400000" algn="ctr" rotWithShape="0">
-                  <a:srgbClr val="6E747A">
-                    <a:alpha val="43000"/>
-                  </a:srgbClr>
-                </a:outerShdw>
-              </a:effectLst>
+              <a:latin typeface="Calibri" panose="020F0502020204030204" pitchFamily="34" charset="0"/>
+              <a:cs typeface="Calibri" panose="020F0502020204030204" pitchFamily="34" charset="0"/>
             </a:endParaRPr>
           </a:p>
         </p:txBody>
@@ -9937,6 +10298,713 @@
           </a:p>
         </p:txBody>
       </p:sp>
+      <p:sp>
+        <p:nvSpPr>
+          <p:cNvPr id="2" name="Rectangle 1">
+            <a:extLst>
+              <a:ext uri="{FF2B5EF4-FFF2-40B4-BE49-F238E27FC236}">
+                <a16:creationId xmlns:a16="http://schemas.microsoft.com/office/drawing/2014/main" id="{EEDB932B-F1D3-1851-ECF1-7025F12FB61C}"/>
+              </a:ext>
+            </a:extLst>
+          </p:cNvPr>
+          <p:cNvSpPr/>
+          <p:nvPr/>
+        </p:nvSpPr>
+        <p:spPr>
+          <a:xfrm>
+            <a:off x="6463933" y="506233"/>
+            <a:ext cx="396262" cy="584775"/>
+          </a:xfrm>
+          <a:prstGeom prst="rect">
+            <a:avLst/>
+          </a:prstGeom>
+          <a:noFill/>
+        </p:spPr>
+        <p:txBody>
+          <a:bodyPr wrap="none" lIns="91440" tIns="45720" rIns="91440" bIns="45720">
+            <a:spAutoFit/>
+          </a:bodyPr>
+          <a:lstStyle/>
+          <a:p>
+            <a:pPr algn="just"/>
+            <a:r>
+              <a:rPr lang="en-US" sz="3200" dirty="0">
+                <a:ln w="0"/>
+                <a:solidFill>
+                  <a:schemeClr val="accent1"/>
+                </a:solidFill>
+                <a:effectLst>
+                  <a:outerShdw blurRad="38100" dist="25400" dir="5400000" algn="ctr" rotWithShape="0">
+                    <a:srgbClr val="6E747A">
+                      <a:alpha val="43000"/>
+                    </a:srgbClr>
+                  </a:outerShdw>
+                </a:effectLst>
+                <a:latin typeface="Calibri" panose="020F0502020204030204" pitchFamily="34" charset="0"/>
+                <a:cs typeface="Calibri" panose="020F0502020204030204" pitchFamily="34" charset="0"/>
+              </a:rPr>
+              <a:t>0</a:t>
+            </a:r>
+            <a:endParaRPr lang="en-US" sz="3200" b="0" cap="none" spc="0" dirty="0">
+              <a:ln w="0"/>
+              <a:solidFill>
+                <a:schemeClr val="accent1"/>
+              </a:solidFill>
+              <a:effectLst>
+                <a:outerShdw blurRad="38100" dist="25400" dir="5400000" algn="ctr" rotWithShape="0">
+                  <a:srgbClr val="6E747A">
+                    <a:alpha val="43000"/>
+                  </a:srgbClr>
+                </a:outerShdw>
+              </a:effectLst>
+              <a:latin typeface="Calibri" panose="020F0502020204030204" pitchFamily="34" charset="0"/>
+              <a:cs typeface="Calibri" panose="020F0502020204030204" pitchFamily="34" charset="0"/>
+            </a:endParaRPr>
+          </a:p>
+        </p:txBody>
+      </p:sp>
+      <p:sp>
+        <p:nvSpPr>
+          <p:cNvPr id="3" name="Rectangle 2">
+            <a:extLst>
+              <a:ext uri="{FF2B5EF4-FFF2-40B4-BE49-F238E27FC236}">
+                <a16:creationId xmlns:a16="http://schemas.microsoft.com/office/drawing/2014/main" id="{C9169AC7-1D89-6F3C-9BB7-EC39C177BE39}"/>
+              </a:ext>
+            </a:extLst>
+          </p:cNvPr>
+          <p:cNvSpPr/>
+          <p:nvPr/>
+        </p:nvSpPr>
+        <p:spPr>
+          <a:xfrm>
+            <a:off x="7980313" y="911013"/>
+            <a:ext cx="393056" cy="584775"/>
+          </a:xfrm>
+          <a:prstGeom prst="rect">
+            <a:avLst/>
+          </a:prstGeom>
+          <a:noFill/>
+        </p:spPr>
+        <p:txBody>
+          <a:bodyPr wrap="none" lIns="91440" tIns="45720" rIns="91440" bIns="45720">
+            <a:spAutoFit/>
+          </a:bodyPr>
+          <a:lstStyle/>
+          <a:p>
+            <a:pPr algn="just"/>
+            <a:r>
+              <a:rPr lang="en-US" sz="3200" dirty="0">
+                <a:ln w="0"/>
+                <a:solidFill>
+                  <a:schemeClr val="accent1"/>
+                </a:solidFill>
+                <a:effectLst>
+                  <a:outerShdw blurRad="38100" dist="25400" dir="5400000" algn="ctr" rotWithShape="0">
+                    <a:srgbClr val="6E747A">
+                      <a:alpha val="43000"/>
+                    </a:srgbClr>
+                  </a:outerShdw>
+                </a:effectLst>
+                <a:latin typeface="Calibri" panose="020F0502020204030204" pitchFamily="34" charset="0"/>
+                <a:cs typeface="Calibri" panose="020F0502020204030204" pitchFamily="34" charset="0"/>
+              </a:rPr>
+              <a:t>1</a:t>
+            </a:r>
+            <a:endParaRPr lang="en-US" sz="3200" b="0" cap="none" spc="0" dirty="0">
+              <a:ln w="0"/>
+              <a:solidFill>
+                <a:schemeClr val="accent1"/>
+              </a:solidFill>
+              <a:effectLst>
+                <a:outerShdw blurRad="38100" dist="25400" dir="5400000" algn="ctr" rotWithShape="0">
+                  <a:srgbClr val="6E747A">
+                    <a:alpha val="43000"/>
+                  </a:srgbClr>
+                </a:outerShdw>
+              </a:effectLst>
+              <a:latin typeface="Calibri" panose="020F0502020204030204" pitchFamily="34" charset="0"/>
+              <a:cs typeface="Calibri" panose="020F0502020204030204" pitchFamily="34" charset="0"/>
+            </a:endParaRPr>
+          </a:p>
+        </p:txBody>
+      </p:sp>
+      <p:sp>
+        <p:nvSpPr>
+          <p:cNvPr id="6" name="Rectangle 5">
+            <a:extLst>
+              <a:ext uri="{FF2B5EF4-FFF2-40B4-BE49-F238E27FC236}">
+                <a16:creationId xmlns:a16="http://schemas.microsoft.com/office/drawing/2014/main" id="{D7F6B766-C528-93B1-AC85-DDF75B854AC3}"/>
+              </a:ext>
+            </a:extLst>
+          </p:cNvPr>
+          <p:cNvSpPr/>
+          <p:nvPr/>
+        </p:nvSpPr>
+        <p:spPr>
+          <a:xfrm>
+            <a:off x="4825724" y="1005690"/>
+            <a:ext cx="518091" cy="584775"/>
+          </a:xfrm>
+          <a:prstGeom prst="rect">
+            <a:avLst/>
+          </a:prstGeom>
+          <a:noFill/>
+        </p:spPr>
+        <p:txBody>
+          <a:bodyPr wrap="none" lIns="91440" tIns="45720" rIns="91440" bIns="45720">
+            <a:spAutoFit/>
+          </a:bodyPr>
+          <a:lstStyle/>
+          <a:p>
+            <a:pPr algn="just"/>
+            <a:r>
+              <a:rPr lang="en-US" sz="3200" dirty="0">
+                <a:ln w="0"/>
+                <a:solidFill>
+                  <a:schemeClr val="accent1"/>
+                </a:solidFill>
+                <a:effectLst>
+                  <a:outerShdw blurRad="38100" dist="25400" dir="5400000" algn="ctr" rotWithShape="0">
+                    <a:srgbClr val="6E747A">
+                      <a:alpha val="43000"/>
+                    </a:srgbClr>
+                  </a:outerShdw>
+                </a:effectLst>
+                <a:latin typeface="Calibri" panose="020F0502020204030204" pitchFamily="34" charset="0"/>
+                <a:cs typeface="Calibri" panose="020F0502020204030204" pitchFamily="34" charset="0"/>
+              </a:rPr>
+              <a:t>-1</a:t>
+            </a:r>
+            <a:endParaRPr lang="en-US" sz="3200" b="0" cap="none" spc="0" dirty="0">
+              <a:ln w="0"/>
+              <a:solidFill>
+                <a:schemeClr val="accent1"/>
+              </a:solidFill>
+              <a:effectLst>
+                <a:outerShdw blurRad="38100" dist="25400" dir="5400000" algn="ctr" rotWithShape="0">
+                  <a:srgbClr val="6E747A">
+                    <a:alpha val="43000"/>
+                  </a:srgbClr>
+                </a:outerShdw>
+              </a:effectLst>
+              <a:latin typeface="Calibri" panose="020F0502020204030204" pitchFamily="34" charset="0"/>
+              <a:cs typeface="Calibri" panose="020F0502020204030204" pitchFamily="34" charset="0"/>
+            </a:endParaRPr>
+          </a:p>
+        </p:txBody>
+      </p:sp>
+      <p:sp>
+        <p:nvSpPr>
+          <p:cNvPr id="9" name="Rectangle 8">
+            <a:extLst>
+              <a:ext uri="{FF2B5EF4-FFF2-40B4-BE49-F238E27FC236}">
+                <a16:creationId xmlns:a16="http://schemas.microsoft.com/office/drawing/2014/main" id="{9EA29200-BAC9-18D1-CB2C-966AB8D1627E}"/>
+              </a:ext>
+            </a:extLst>
+          </p:cNvPr>
+          <p:cNvSpPr/>
+          <p:nvPr/>
+        </p:nvSpPr>
+        <p:spPr>
+          <a:xfrm>
+            <a:off x="3796276" y="2541661"/>
+            <a:ext cx="1154483" cy="584775"/>
+          </a:xfrm>
+          <a:prstGeom prst="rect">
+            <a:avLst/>
+          </a:prstGeom>
+          <a:noFill/>
+        </p:spPr>
+        <p:txBody>
+          <a:bodyPr wrap="none" lIns="91440" tIns="45720" rIns="91440" bIns="45720">
+            <a:spAutoFit/>
+          </a:bodyPr>
+          <a:lstStyle/>
+          <a:p>
+            <a:pPr algn="just"/>
+            <a:r>
+              <a:rPr lang="en-US" sz="3200" dirty="0">
+                <a:ln w="0"/>
+                <a:solidFill>
+                  <a:schemeClr val="accent1"/>
+                </a:solidFill>
+                <a:effectLst>
+                  <a:outerShdw blurRad="38100" dist="25400" dir="5400000" algn="ctr" rotWithShape="0">
+                    <a:srgbClr val="6E747A">
+                      <a:alpha val="43000"/>
+                    </a:srgbClr>
+                  </a:outerShdw>
+                </a:effectLst>
+                <a:latin typeface="Calibri" panose="020F0502020204030204" pitchFamily="34" charset="0"/>
+                <a:cs typeface="Calibri" panose="020F0502020204030204" pitchFamily="34" charset="0"/>
+              </a:rPr>
+              <a:t>-1000</a:t>
+            </a:r>
+            <a:endParaRPr lang="en-US" sz="3200" b="0" cap="none" spc="0" dirty="0">
+              <a:ln w="0"/>
+              <a:solidFill>
+                <a:schemeClr val="accent1"/>
+              </a:solidFill>
+              <a:effectLst>
+                <a:outerShdw blurRad="38100" dist="25400" dir="5400000" algn="ctr" rotWithShape="0">
+                  <a:srgbClr val="6E747A">
+                    <a:alpha val="43000"/>
+                  </a:srgbClr>
+                </a:outerShdw>
+              </a:effectLst>
+              <a:latin typeface="Calibri" panose="020F0502020204030204" pitchFamily="34" charset="0"/>
+              <a:cs typeface="Calibri" panose="020F0502020204030204" pitchFamily="34" charset="0"/>
+            </a:endParaRPr>
+          </a:p>
+        </p:txBody>
+      </p:sp>
+      <p:sp>
+        <p:nvSpPr>
+          <p:cNvPr id="10" name="Rectangle 9">
+            <a:extLst>
+              <a:ext uri="{FF2B5EF4-FFF2-40B4-BE49-F238E27FC236}">
+                <a16:creationId xmlns:a16="http://schemas.microsoft.com/office/drawing/2014/main" id="{F78D2534-1CD7-00E2-9022-01B4384AFE51}"/>
+              </a:ext>
+            </a:extLst>
+          </p:cNvPr>
+          <p:cNvSpPr/>
+          <p:nvPr/>
+        </p:nvSpPr>
+        <p:spPr>
+          <a:xfrm>
+            <a:off x="8373369" y="2447767"/>
+            <a:ext cx="1018227" cy="584775"/>
+          </a:xfrm>
+          <a:prstGeom prst="rect">
+            <a:avLst/>
+          </a:prstGeom>
+          <a:noFill/>
+        </p:spPr>
+        <p:txBody>
+          <a:bodyPr wrap="none" lIns="91440" tIns="45720" rIns="91440" bIns="45720">
+            <a:spAutoFit/>
+          </a:bodyPr>
+          <a:lstStyle/>
+          <a:p>
+            <a:pPr algn="just"/>
+            <a:r>
+              <a:rPr lang="en-US" sz="3200" dirty="0">
+                <a:ln w="0"/>
+                <a:solidFill>
+                  <a:schemeClr val="accent1"/>
+                </a:solidFill>
+                <a:effectLst>
+                  <a:outerShdw blurRad="38100" dist="25400" dir="5400000" algn="ctr" rotWithShape="0">
+                    <a:srgbClr val="6E747A">
+                      <a:alpha val="43000"/>
+                    </a:srgbClr>
+                  </a:outerShdw>
+                </a:effectLst>
+                <a:latin typeface="Calibri" panose="020F0502020204030204" pitchFamily="34" charset="0"/>
+                <a:cs typeface="Calibri" panose="020F0502020204030204" pitchFamily="34" charset="0"/>
+              </a:rPr>
+              <a:t>1000</a:t>
+            </a:r>
+            <a:endParaRPr lang="en-US" sz="3200" b="0" cap="none" spc="0" dirty="0">
+              <a:ln w="0"/>
+              <a:solidFill>
+                <a:schemeClr val="accent1"/>
+              </a:solidFill>
+              <a:effectLst>
+                <a:outerShdw blurRad="38100" dist="25400" dir="5400000" algn="ctr" rotWithShape="0">
+                  <a:srgbClr val="6E747A">
+                    <a:alpha val="43000"/>
+                  </a:srgbClr>
+                </a:outerShdw>
+              </a:effectLst>
+              <a:latin typeface="Calibri" panose="020F0502020204030204" pitchFamily="34" charset="0"/>
+              <a:cs typeface="Calibri" panose="020F0502020204030204" pitchFamily="34" charset="0"/>
+            </a:endParaRPr>
+          </a:p>
+        </p:txBody>
+      </p:sp>
+      <p:sp>
+        <p:nvSpPr>
+          <p:cNvPr id="11" name="Rectangle 10">
+            <a:extLst>
+              <a:ext uri="{FF2B5EF4-FFF2-40B4-BE49-F238E27FC236}">
+                <a16:creationId xmlns:a16="http://schemas.microsoft.com/office/drawing/2014/main" id="{378663E0-9823-CDD1-BCA3-ACEB4606BC9D}"/>
+              </a:ext>
+            </a:extLst>
+          </p:cNvPr>
+          <p:cNvSpPr/>
+          <p:nvPr/>
+        </p:nvSpPr>
+        <p:spPr>
+          <a:xfrm>
+            <a:off x="6915612" y="4101116"/>
+            <a:ext cx="184731" cy="584775"/>
+          </a:xfrm>
+          <a:prstGeom prst="rect">
+            <a:avLst/>
+          </a:prstGeom>
+          <a:noFill/>
+        </p:spPr>
+        <p:txBody>
+          <a:bodyPr wrap="none" lIns="91440" tIns="45720" rIns="91440" bIns="45720">
+            <a:spAutoFit/>
+          </a:bodyPr>
+          <a:lstStyle/>
+          <a:p>
+            <a:pPr algn="just"/>
+            <a:endParaRPr lang="en-US" sz="3200" b="0" cap="none" spc="0" dirty="0">
+              <a:ln w="0"/>
+              <a:solidFill>
+                <a:schemeClr val="accent1"/>
+              </a:solidFill>
+              <a:effectLst>
+                <a:outerShdw blurRad="38100" dist="25400" dir="5400000" algn="ctr" rotWithShape="0">
+                  <a:srgbClr val="6E747A">
+                    <a:alpha val="43000"/>
+                  </a:srgbClr>
+                </a:outerShdw>
+              </a:effectLst>
+              <a:latin typeface="Calibri" panose="020F0502020204030204" pitchFamily="34" charset="0"/>
+              <a:cs typeface="Calibri" panose="020F0502020204030204" pitchFamily="34" charset="0"/>
+            </a:endParaRPr>
+          </a:p>
+        </p:txBody>
+      </p:sp>
+      <p:sp>
+        <p:nvSpPr>
+          <p:cNvPr id="15" name="Rectangle 14">
+            <a:extLst>
+              <a:ext uri="{FF2B5EF4-FFF2-40B4-BE49-F238E27FC236}">
+                <a16:creationId xmlns:a16="http://schemas.microsoft.com/office/drawing/2014/main" id="{27864762-ED14-DD3E-1744-6104A644D898}"/>
+              </a:ext>
+            </a:extLst>
+          </p:cNvPr>
+          <p:cNvSpPr/>
+          <p:nvPr/>
+        </p:nvSpPr>
+        <p:spPr>
+          <a:xfrm>
+            <a:off x="5113434" y="4219274"/>
+            <a:ext cx="4144083" cy="584775"/>
+          </a:xfrm>
+          <a:prstGeom prst="rect">
+            <a:avLst/>
+          </a:prstGeom>
+          <a:noFill/>
+        </p:spPr>
+        <p:txBody>
+          <a:bodyPr wrap="none" lIns="91440" tIns="45720" rIns="91440" bIns="45720">
+            <a:spAutoFit/>
+          </a:bodyPr>
+          <a:lstStyle/>
+          <a:p>
+            <a:pPr algn="just"/>
+            <a:r>
+              <a:rPr lang="en-US" sz="3200" dirty="0">
+                <a:ln w="0"/>
+                <a:solidFill>
+                  <a:schemeClr val="accent1"/>
+                </a:solidFill>
+                <a:effectLst>
+                  <a:outerShdw blurRad="38100" dist="25400" dir="5400000" algn="ctr" rotWithShape="0">
+                    <a:srgbClr val="6E747A">
+                      <a:alpha val="43000"/>
+                    </a:srgbClr>
+                  </a:outerShdw>
+                </a:effectLst>
+                <a:latin typeface="Calibri" panose="020F0502020204030204" pitchFamily="34" charset="0"/>
+                <a:cs typeface="Calibri" panose="020F0502020204030204" pitchFamily="34" charset="0"/>
+              </a:rPr>
+              <a:t>9223372036854775807</a:t>
+            </a:r>
+            <a:endParaRPr lang="en-US" sz="3200" b="0" cap="none" spc="0" dirty="0">
+              <a:ln w="0"/>
+              <a:solidFill>
+                <a:schemeClr val="accent1"/>
+              </a:solidFill>
+              <a:effectLst>
+                <a:outerShdw blurRad="38100" dist="25400" dir="5400000" algn="ctr" rotWithShape="0">
+                  <a:srgbClr val="6E747A">
+                    <a:alpha val="43000"/>
+                  </a:srgbClr>
+                </a:outerShdw>
+              </a:effectLst>
+              <a:latin typeface="Calibri" panose="020F0502020204030204" pitchFamily="34" charset="0"/>
+              <a:cs typeface="Calibri" panose="020F0502020204030204" pitchFamily="34" charset="0"/>
+            </a:endParaRPr>
+          </a:p>
+        </p:txBody>
+      </p:sp>
+      <p:cxnSp>
+        <p:nvCxnSpPr>
+          <p:cNvPr id="18" name="Straight Connector 17">
+            <a:extLst>
+              <a:ext uri="{FF2B5EF4-FFF2-40B4-BE49-F238E27FC236}">
+                <a16:creationId xmlns:a16="http://schemas.microsoft.com/office/drawing/2014/main" id="{A163D3EA-80A1-07AD-403C-F9725C8B636C}"/>
+              </a:ext>
+            </a:extLst>
+          </p:cNvPr>
+          <p:cNvCxnSpPr>
+            <a:cxnSpLocks/>
+          </p:cNvCxnSpPr>
+          <p:nvPr/>
+        </p:nvCxnSpPr>
+        <p:spPr>
+          <a:xfrm flipV="1">
+            <a:off x="6668278" y="1250302"/>
+            <a:ext cx="0" cy="534955"/>
+          </a:xfrm>
+          <a:prstGeom prst="line">
+            <a:avLst/>
+          </a:prstGeom>
+          <a:ln w="76200">
+            <a:solidFill>
+              <a:schemeClr val="accent1">
+                <a:lumMod val="50000"/>
+              </a:schemeClr>
+            </a:solidFill>
+          </a:ln>
+        </p:spPr>
+        <p:style>
+          <a:lnRef idx="1">
+            <a:schemeClr val="accent1"/>
+          </a:lnRef>
+          <a:fillRef idx="0">
+            <a:schemeClr val="accent1"/>
+          </a:fillRef>
+          <a:effectRef idx="0">
+            <a:schemeClr val="accent1"/>
+          </a:effectRef>
+          <a:fontRef idx="minor">
+            <a:schemeClr val="tx1"/>
+          </a:fontRef>
+        </p:style>
+      </p:cxnSp>
+      <p:cxnSp>
+        <p:nvCxnSpPr>
+          <p:cNvPr id="20" name="Straight Connector 19">
+            <a:extLst>
+              <a:ext uri="{FF2B5EF4-FFF2-40B4-BE49-F238E27FC236}">
+                <a16:creationId xmlns:a16="http://schemas.microsoft.com/office/drawing/2014/main" id="{483B7126-87CE-74E2-1343-BC91C67EC231}"/>
+              </a:ext>
+            </a:extLst>
+          </p:cNvPr>
+          <p:cNvCxnSpPr>
+            <a:cxnSpLocks/>
+          </p:cNvCxnSpPr>
+          <p:nvPr/>
+        </p:nvCxnSpPr>
+        <p:spPr>
+          <a:xfrm flipV="1">
+            <a:off x="7464490" y="1495788"/>
+            <a:ext cx="447869" cy="480973"/>
+          </a:xfrm>
+          <a:prstGeom prst="line">
+            <a:avLst/>
+          </a:prstGeom>
+          <a:ln w="76200">
+            <a:solidFill>
+              <a:schemeClr val="accent1">
+                <a:lumMod val="50000"/>
+              </a:schemeClr>
+            </a:solidFill>
+          </a:ln>
+        </p:spPr>
+        <p:style>
+          <a:lnRef idx="1">
+            <a:schemeClr val="accent1"/>
+          </a:lnRef>
+          <a:fillRef idx="0">
+            <a:schemeClr val="accent1"/>
+          </a:fillRef>
+          <a:effectRef idx="0">
+            <a:schemeClr val="accent1"/>
+          </a:effectRef>
+          <a:fontRef idx="minor">
+            <a:schemeClr val="tx1"/>
+          </a:fontRef>
+        </p:style>
+      </p:cxnSp>
+      <p:cxnSp>
+        <p:nvCxnSpPr>
+          <p:cNvPr id="24" name="Straight Connector 23">
+            <a:extLst>
+              <a:ext uri="{FF2B5EF4-FFF2-40B4-BE49-F238E27FC236}">
+                <a16:creationId xmlns:a16="http://schemas.microsoft.com/office/drawing/2014/main" id="{99006AC1-B80C-4198-9928-A395D1A9F33D}"/>
+              </a:ext>
+            </a:extLst>
+          </p:cNvPr>
+          <p:cNvCxnSpPr>
+            <a:cxnSpLocks/>
+          </p:cNvCxnSpPr>
+          <p:nvPr/>
+        </p:nvCxnSpPr>
+        <p:spPr>
+          <a:xfrm flipH="1" flipV="1">
+            <a:off x="5424196" y="1590465"/>
+            <a:ext cx="255037" cy="386296"/>
+          </a:xfrm>
+          <a:prstGeom prst="line">
+            <a:avLst/>
+          </a:prstGeom>
+          <a:ln w="76200">
+            <a:solidFill>
+              <a:schemeClr val="accent1">
+                <a:lumMod val="50000"/>
+              </a:schemeClr>
+            </a:solidFill>
+          </a:ln>
+        </p:spPr>
+        <p:style>
+          <a:lnRef idx="1">
+            <a:schemeClr val="accent1"/>
+          </a:lnRef>
+          <a:fillRef idx="0">
+            <a:schemeClr val="accent1"/>
+          </a:fillRef>
+          <a:effectRef idx="0">
+            <a:schemeClr val="accent1"/>
+          </a:effectRef>
+          <a:fontRef idx="minor">
+            <a:schemeClr val="tx1"/>
+          </a:fontRef>
+        </p:style>
+      </p:cxnSp>
+      <p:cxnSp>
+        <p:nvCxnSpPr>
+          <p:cNvPr id="27" name="Straight Connector 26">
+            <a:extLst>
+              <a:ext uri="{FF2B5EF4-FFF2-40B4-BE49-F238E27FC236}">
+                <a16:creationId xmlns:a16="http://schemas.microsoft.com/office/drawing/2014/main" id="{4DF8D318-215C-063B-09AB-F877298C52A5}"/>
+              </a:ext>
+            </a:extLst>
+          </p:cNvPr>
+          <p:cNvCxnSpPr>
+            <a:cxnSpLocks/>
+          </p:cNvCxnSpPr>
+          <p:nvPr/>
+        </p:nvCxnSpPr>
+        <p:spPr>
+          <a:xfrm flipH="1">
+            <a:off x="4950759" y="2593910"/>
+            <a:ext cx="591447" cy="111968"/>
+          </a:xfrm>
+          <a:prstGeom prst="line">
+            <a:avLst/>
+          </a:prstGeom>
+          <a:ln w="76200">
+            <a:solidFill>
+              <a:schemeClr val="accent1">
+                <a:lumMod val="50000"/>
+              </a:schemeClr>
+            </a:solidFill>
+          </a:ln>
+        </p:spPr>
+        <p:style>
+          <a:lnRef idx="1">
+            <a:schemeClr val="accent1"/>
+          </a:lnRef>
+          <a:fillRef idx="0">
+            <a:schemeClr val="accent1"/>
+          </a:fillRef>
+          <a:effectRef idx="0">
+            <a:schemeClr val="accent1"/>
+          </a:effectRef>
+          <a:fontRef idx="minor">
+            <a:schemeClr val="tx1"/>
+          </a:fontRef>
+        </p:style>
+      </p:cxnSp>
+      <p:cxnSp>
+        <p:nvCxnSpPr>
+          <p:cNvPr id="30" name="Straight Connector 29">
+            <a:extLst>
+              <a:ext uri="{FF2B5EF4-FFF2-40B4-BE49-F238E27FC236}">
+                <a16:creationId xmlns:a16="http://schemas.microsoft.com/office/drawing/2014/main" id="{495D8700-72F7-7798-FCE9-FDFA6FA20B73}"/>
+              </a:ext>
+            </a:extLst>
+          </p:cNvPr>
+          <p:cNvCxnSpPr>
+            <a:cxnSpLocks/>
+          </p:cNvCxnSpPr>
+          <p:nvPr/>
+        </p:nvCxnSpPr>
+        <p:spPr>
+          <a:xfrm>
+            <a:off x="6718041" y="2954694"/>
+            <a:ext cx="142154" cy="1197429"/>
+          </a:xfrm>
+          <a:prstGeom prst="line">
+            <a:avLst/>
+          </a:prstGeom>
+          <a:ln w="76200">
+            <a:solidFill>
+              <a:schemeClr val="accent1">
+                <a:lumMod val="50000"/>
+              </a:schemeClr>
+            </a:solidFill>
+          </a:ln>
+        </p:spPr>
+        <p:style>
+          <a:lnRef idx="1">
+            <a:schemeClr val="accent1"/>
+          </a:lnRef>
+          <a:fillRef idx="0">
+            <a:schemeClr val="accent1"/>
+          </a:fillRef>
+          <a:effectRef idx="0">
+            <a:schemeClr val="accent1"/>
+          </a:effectRef>
+          <a:fontRef idx="minor">
+            <a:schemeClr val="tx1"/>
+          </a:fontRef>
+        </p:style>
+      </p:cxnSp>
+      <p:cxnSp>
+        <p:nvCxnSpPr>
+          <p:cNvPr id="34" name="Straight Connector 33">
+            <a:extLst>
+              <a:ext uri="{FF2B5EF4-FFF2-40B4-BE49-F238E27FC236}">
+                <a16:creationId xmlns:a16="http://schemas.microsoft.com/office/drawing/2014/main" id="{4C9D89F6-91C8-65D8-0117-61BE55EC5D6C}"/>
+              </a:ext>
+            </a:extLst>
+          </p:cNvPr>
+          <p:cNvCxnSpPr>
+            <a:cxnSpLocks/>
+          </p:cNvCxnSpPr>
+          <p:nvPr/>
+        </p:nvCxnSpPr>
+        <p:spPr>
+          <a:xfrm>
+            <a:off x="7781922" y="2593910"/>
+            <a:ext cx="516102" cy="152400"/>
+          </a:xfrm>
+          <a:prstGeom prst="line">
+            <a:avLst/>
+          </a:prstGeom>
+          <a:ln w="76200">
+            <a:solidFill>
+              <a:schemeClr val="accent1">
+                <a:lumMod val="50000"/>
+              </a:schemeClr>
+            </a:solidFill>
+          </a:ln>
+        </p:spPr>
+        <p:style>
+          <a:lnRef idx="1">
+            <a:schemeClr val="accent1"/>
+          </a:lnRef>
+          <a:fillRef idx="0">
+            <a:schemeClr val="accent1"/>
+          </a:fillRef>
+          <a:effectRef idx="0">
+            <a:schemeClr val="accent1"/>
+          </a:effectRef>
+          <a:fontRef idx="minor">
+            <a:schemeClr val="tx1"/>
+          </a:fontRef>
+        </p:style>
+      </p:cxnSp>
     </p:spTree>
     <p:extLst>
       <p:ext uri="{BB962C8B-B14F-4D97-AF65-F5344CB8AC3E}">
@@ -9947,6 +11015,473 @@
   <p:clrMapOvr>
     <a:masterClrMapping/>
   </p:clrMapOvr>
+  <p:timing>
+    <p:tnLst>
+      <p:par>
+        <p:cTn id="1" dur="indefinite" restart="never" nodeType="tmRoot">
+          <p:childTnLst>
+            <p:seq concurrent="1" nextAc="seek">
+              <p:cTn id="2" dur="indefinite" nodeType="mainSeq">
+                <p:childTnLst>
+                  <p:par>
+                    <p:cTn id="3" fill="hold">
+                      <p:stCondLst>
+                        <p:cond delay="indefinite"/>
+                      </p:stCondLst>
+                      <p:childTnLst>
+                        <p:par>
+                          <p:cTn id="4" fill="hold">
+                            <p:stCondLst>
+                              <p:cond delay="0"/>
+                            </p:stCondLst>
+                            <p:childTnLst>
+                              <p:par>
+                                <p:cTn id="5" presetID="1" presetClass="entr" presetSubtype="0" fill="hold" grpId="0" nodeType="clickEffect">
+                                  <p:stCondLst>
+                                    <p:cond delay="0"/>
+                                  </p:stCondLst>
+                                  <p:childTnLst>
+                                    <p:set>
+                                      <p:cBhvr>
+                                        <p:cTn id="6" dur="1" fill="hold">
+                                          <p:stCondLst>
+                                            <p:cond delay="0"/>
+                                          </p:stCondLst>
+                                        </p:cTn>
+                                        <p:tgtEl>
+                                          <p:spTgt spid="2"/>
+                                        </p:tgtEl>
+                                        <p:attrNameLst>
+                                          <p:attrName>style.visibility</p:attrName>
+                                        </p:attrNameLst>
+                                      </p:cBhvr>
+                                      <p:to>
+                                        <p:strVal val="visible"/>
+                                      </p:to>
+                                    </p:set>
+                                  </p:childTnLst>
+                                </p:cTn>
+                              </p:par>
+                            </p:childTnLst>
+                          </p:cTn>
+                        </p:par>
+                        <p:par>
+                          <p:cTn id="7" fill="hold">
+                            <p:stCondLst>
+                              <p:cond delay="0"/>
+                            </p:stCondLst>
+                            <p:childTnLst>
+                              <p:par>
+                                <p:cTn id="8" presetID="1" presetClass="entr" presetSubtype="0" fill="hold" grpId="0" nodeType="afterEffect">
+                                  <p:stCondLst>
+                                    <p:cond delay="0"/>
+                                  </p:stCondLst>
+                                  <p:childTnLst>
+                                    <p:set>
+                                      <p:cBhvr>
+                                        <p:cTn id="9" dur="1" fill="hold">
+                                          <p:stCondLst>
+                                            <p:cond delay="0"/>
+                                          </p:stCondLst>
+                                        </p:cTn>
+                                        <p:tgtEl>
+                                          <p:spTgt spid="3"/>
+                                        </p:tgtEl>
+                                        <p:attrNameLst>
+                                          <p:attrName>style.visibility</p:attrName>
+                                        </p:attrNameLst>
+                                      </p:cBhvr>
+                                      <p:to>
+                                        <p:strVal val="visible"/>
+                                      </p:to>
+                                    </p:set>
+                                  </p:childTnLst>
+                                </p:cTn>
+                              </p:par>
+                            </p:childTnLst>
+                          </p:cTn>
+                        </p:par>
+                        <p:par>
+                          <p:cTn id="10" fill="hold">
+                            <p:stCondLst>
+                              <p:cond delay="0"/>
+                            </p:stCondLst>
+                            <p:childTnLst>
+                              <p:par>
+                                <p:cTn id="11" presetID="1" presetClass="entr" presetSubtype="0" fill="hold" grpId="0" nodeType="afterEffect">
+                                  <p:stCondLst>
+                                    <p:cond delay="0"/>
+                                  </p:stCondLst>
+                                  <p:childTnLst>
+                                    <p:set>
+                                      <p:cBhvr>
+                                        <p:cTn id="12" dur="1" fill="hold">
+                                          <p:stCondLst>
+                                            <p:cond delay="0"/>
+                                          </p:stCondLst>
+                                        </p:cTn>
+                                        <p:tgtEl>
+                                          <p:spTgt spid="6"/>
+                                        </p:tgtEl>
+                                        <p:attrNameLst>
+                                          <p:attrName>style.visibility</p:attrName>
+                                        </p:attrNameLst>
+                                      </p:cBhvr>
+                                      <p:to>
+                                        <p:strVal val="visible"/>
+                                      </p:to>
+                                    </p:set>
+                                  </p:childTnLst>
+                                </p:cTn>
+                              </p:par>
+                            </p:childTnLst>
+                          </p:cTn>
+                        </p:par>
+                        <p:par>
+                          <p:cTn id="13" fill="hold">
+                            <p:stCondLst>
+                              <p:cond delay="0"/>
+                            </p:stCondLst>
+                            <p:childTnLst>
+                              <p:par>
+                                <p:cTn id="14" presetID="1" presetClass="entr" presetSubtype="0" fill="hold" grpId="0" nodeType="afterEffect">
+                                  <p:stCondLst>
+                                    <p:cond delay="0"/>
+                                  </p:stCondLst>
+                                  <p:childTnLst>
+                                    <p:set>
+                                      <p:cBhvr>
+                                        <p:cTn id="15" dur="1" fill="hold">
+                                          <p:stCondLst>
+                                            <p:cond delay="0"/>
+                                          </p:stCondLst>
+                                        </p:cTn>
+                                        <p:tgtEl>
+                                          <p:spTgt spid="9"/>
+                                        </p:tgtEl>
+                                        <p:attrNameLst>
+                                          <p:attrName>style.visibility</p:attrName>
+                                        </p:attrNameLst>
+                                      </p:cBhvr>
+                                      <p:to>
+                                        <p:strVal val="visible"/>
+                                      </p:to>
+                                    </p:set>
+                                  </p:childTnLst>
+                                </p:cTn>
+                              </p:par>
+                            </p:childTnLst>
+                          </p:cTn>
+                        </p:par>
+                        <p:par>
+                          <p:cTn id="16" fill="hold">
+                            <p:stCondLst>
+                              <p:cond delay="0"/>
+                            </p:stCondLst>
+                            <p:childTnLst>
+                              <p:par>
+                                <p:cTn id="17" presetID="1" presetClass="entr" presetSubtype="0" fill="hold" grpId="0" nodeType="afterEffect">
+                                  <p:stCondLst>
+                                    <p:cond delay="0"/>
+                                  </p:stCondLst>
+                                  <p:childTnLst>
+                                    <p:set>
+                                      <p:cBhvr>
+                                        <p:cTn id="18" dur="1" fill="hold">
+                                          <p:stCondLst>
+                                            <p:cond delay="0"/>
+                                          </p:stCondLst>
+                                        </p:cTn>
+                                        <p:tgtEl>
+                                          <p:spTgt spid="10"/>
+                                        </p:tgtEl>
+                                        <p:attrNameLst>
+                                          <p:attrName>style.visibility</p:attrName>
+                                        </p:attrNameLst>
+                                      </p:cBhvr>
+                                      <p:to>
+                                        <p:strVal val="visible"/>
+                                      </p:to>
+                                    </p:set>
+                                  </p:childTnLst>
+                                </p:cTn>
+                              </p:par>
+                            </p:childTnLst>
+                          </p:cTn>
+                        </p:par>
+                        <p:par>
+                          <p:cTn id="19" fill="hold">
+                            <p:stCondLst>
+                              <p:cond delay="0"/>
+                            </p:stCondLst>
+                            <p:childTnLst>
+                              <p:par>
+                                <p:cTn id="20" presetID="1" presetClass="entr" presetSubtype="0" fill="hold" grpId="0" nodeType="afterEffect" nodePh="1">
+                                  <p:stCondLst>
+                                    <p:cond delay="0"/>
+                                  </p:stCondLst>
+                                  <p:endCondLst>
+                                    <p:cond evt="begin" delay="0">
+                                      <p:tn val="20"/>
+                                    </p:cond>
+                                  </p:endCondLst>
+                                  <p:childTnLst>
+                                    <p:set>
+                                      <p:cBhvr>
+                                        <p:cTn id="21" dur="1" fill="hold">
+                                          <p:stCondLst>
+                                            <p:cond delay="0"/>
+                                          </p:stCondLst>
+                                        </p:cTn>
+                                        <p:tgtEl>
+                                          <p:spTgt spid="11"/>
+                                        </p:tgtEl>
+                                        <p:attrNameLst>
+                                          <p:attrName>style.visibility</p:attrName>
+                                        </p:attrNameLst>
+                                      </p:cBhvr>
+                                      <p:to>
+                                        <p:strVal val="visible"/>
+                                      </p:to>
+                                    </p:set>
+                                  </p:childTnLst>
+                                </p:cTn>
+                              </p:par>
+                            </p:childTnLst>
+                          </p:cTn>
+                        </p:par>
+                        <p:par>
+                          <p:cTn id="22" fill="hold">
+                            <p:stCondLst>
+                              <p:cond delay="0"/>
+                            </p:stCondLst>
+                            <p:childTnLst>
+                              <p:par>
+                                <p:cTn id="23" presetID="1" presetClass="entr" presetSubtype="0" fill="hold" grpId="0" nodeType="afterEffect">
+                                  <p:stCondLst>
+                                    <p:cond delay="0"/>
+                                  </p:stCondLst>
+                                  <p:childTnLst>
+                                    <p:set>
+                                      <p:cBhvr>
+                                        <p:cTn id="24" dur="1" fill="hold">
+                                          <p:stCondLst>
+                                            <p:cond delay="0"/>
+                                          </p:stCondLst>
+                                        </p:cTn>
+                                        <p:tgtEl>
+                                          <p:spTgt spid="15"/>
+                                        </p:tgtEl>
+                                        <p:attrNameLst>
+                                          <p:attrName>style.visibility</p:attrName>
+                                        </p:attrNameLst>
+                                      </p:cBhvr>
+                                      <p:to>
+                                        <p:strVal val="visible"/>
+                                      </p:to>
+                                    </p:set>
+                                  </p:childTnLst>
+                                </p:cTn>
+                              </p:par>
+                              <p:par>
+                                <p:cTn id="25" presetID="1" presetClass="entr" presetSubtype="0" fill="hold" nodeType="withEffect">
+                                  <p:stCondLst>
+                                    <p:cond delay="0"/>
+                                  </p:stCondLst>
+                                  <p:childTnLst>
+                                    <p:set>
+                                      <p:cBhvr>
+                                        <p:cTn id="26" dur="1" fill="hold">
+                                          <p:stCondLst>
+                                            <p:cond delay="0"/>
+                                          </p:stCondLst>
+                                        </p:cTn>
+                                        <p:tgtEl>
+                                          <p:spTgt spid="24"/>
+                                        </p:tgtEl>
+                                        <p:attrNameLst>
+                                          <p:attrName>style.visibility</p:attrName>
+                                        </p:attrNameLst>
+                                      </p:cBhvr>
+                                      <p:to>
+                                        <p:strVal val="visible"/>
+                                      </p:to>
+                                    </p:set>
+                                  </p:childTnLst>
+                                </p:cTn>
+                              </p:par>
+                              <p:par>
+                                <p:cTn id="27" presetID="1" presetClass="entr" presetSubtype="0" fill="hold" nodeType="withEffect">
+                                  <p:stCondLst>
+                                    <p:cond delay="0"/>
+                                  </p:stCondLst>
+                                  <p:childTnLst>
+                                    <p:set>
+                                      <p:cBhvr>
+                                        <p:cTn id="28" dur="1" fill="hold">
+                                          <p:stCondLst>
+                                            <p:cond delay="0"/>
+                                          </p:stCondLst>
+                                        </p:cTn>
+                                        <p:tgtEl>
+                                          <p:spTgt spid="18"/>
+                                        </p:tgtEl>
+                                        <p:attrNameLst>
+                                          <p:attrName>style.visibility</p:attrName>
+                                        </p:attrNameLst>
+                                      </p:cBhvr>
+                                      <p:to>
+                                        <p:strVal val="visible"/>
+                                      </p:to>
+                                    </p:set>
+                                  </p:childTnLst>
+                                </p:cTn>
+                              </p:par>
+                              <p:par>
+                                <p:cTn id="29" presetID="1" presetClass="entr" presetSubtype="0" fill="hold" nodeType="withEffect">
+                                  <p:stCondLst>
+                                    <p:cond delay="0"/>
+                                  </p:stCondLst>
+                                  <p:childTnLst>
+                                    <p:set>
+                                      <p:cBhvr>
+                                        <p:cTn id="30" dur="1" fill="hold">
+                                          <p:stCondLst>
+                                            <p:cond delay="0"/>
+                                          </p:stCondLst>
+                                        </p:cTn>
+                                        <p:tgtEl>
+                                          <p:spTgt spid="20"/>
+                                        </p:tgtEl>
+                                        <p:attrNameLst>
+                                          <p:attrName>style.visibility</p:attrName>
+                                        </p:attrNameLst>
+                                      </p:cBhvr>
+                                      <p:to>
+                                        <p:strVal val="visible"/>
+                                      </p:to>
+                                    </p:set>
+                                  </p:childTnLst>
+                                </p:cTn>
+                              </p:par>
+                              <p:par>
+                                <p:cTn id="31" presetID="1" presetClass="entr" presetSubtype="0" fill="hold" nodeType="withEffect">
+                                  <p:stCondLst>
+                                    <p:cond delay="0"/>
+                                  </p:stCondLst>
+                                  <p:childTnLst>
+                                    <p:set>
+                                      <p:cBhvr>
+                                        <p:cTn id="32" dur="1" fill="hold">
+                                          <p:stCondLst>
+                                            <p:cond delay="0"/>
+                                          </p:stCondLst>
+                                        </p:cTn>
+                                        <p:tgtEl>
+                                          <p:spTgt spid="34"/>
+                                        </p:tgtEl>
+                                        <p:attrNameLst>
+                                          <p:attrName>style.visibility</p:attrName>
+                                        </p:attrNameLst>
+                                      </p:cBhvr>
+                                      <p:to>
+                                        <p:strVal val="visible"/>
+                                      </p:to>
+                                    </p:set>
+                                  </p:childTnLst>
+                                </p:cTn>
+                              </p:par>
+                              <p:par>
+                                <p:cTn id="33" presetID="1" presetClass="entr" presetSubtype="0" fill="hold" nodeType="withEffect">
+                                  <p:stCondLst>
+                                    <p:cond delay="0"/>
+                                  </p:stCondLst>
+                                  <p:childTnLst>
+                                    <p:set>
+                                      <p:cBhvr>
+                                        <p:cTn id="34" dur="1" fill="hold">
+                                          <p:stCondLst>
+                                            <p:cond delay="0"/>
+                                          </p:stCondLst>
+                                        </p:cTn>
+                                        <p:tgtEl>
+                                          <p:spTgt spid="30"/>
+                                        </p:tgtEl>
+                                        <p:attrNameLst>
+                                          <p:attrName>style.visibility</p:attrName>
+                                        </p:attrNameLst>
+                                      </p:cBhvr>
+                                      <p:to>
+                                        <p:strVal val="visible"/>
+                                      </p:to>
+                                    </p:set>
+                                  </p:childTnLst>
+                                </p:cTn>
+                              </p:par>
+                              <p:par>
+                                <p:cTn id="35" presetID="1" presetClass="entr" presetSubtype="0" fill="hold" nodeType="withEffect">
+                                  <p:stCondLst>
+                                    <p:cond delay="0"/>
+                                  </p:stCondLst>
+                                  <p:childTnLst>
+                                    <p:set>
+                                      <p:cBhvr>
+                                        <p:cTn id="36" dur="1" fill="hold">
+                                          <p:stCondLst>
+                                            <p:cond delay="0"/>
+                                          </p:stCondLst>
+                                        </p:cTn>
+                                        <p:tgtEl>
+                                          <p:spTgt spid="27"/>
+                                        </p:tgtEl>
+                                        <p:attrNameLst>
+                                          <p:attrName>style.visibility</p:attrName>
+                                        </p:attrNameLst>
+                                      </p:cBhvr>
+                                      <p:to>
+                                        <p:strVal val="visible"/>
+                                      </p:to>
+                                    </p:set>
+                                  </p:childTnLst>
+                                </p:cTn>
+                              </p:par>
+                            </p:childTnLst>
+                          </p:cTn>
+                        </p:par>
+                      </p:childTnLst>
+                    </p:cTn>
+                  </p:par>
+                </p:childTnLst>
+              </p:cTn>
+              <p:prevCondLst>
+                <p:cond evt="onPrev" delay="0">
+                  <p:tgtEl>
+                    <p:sldTgt/>
+                  </p:tgtEl>
+                </p:cond>
+              </p:prevCondLst>
+              <p:nextCondLst>
+                <p:cond evt="onNext" delay="0">
+                  <p:tgtEl>
+                    <p:sldTgt/>
+                  </p:tgtEl>
+                </p:cond>
+              </p:nextCondLst>
+            </p:seq>
+          </p:childTnLst>
+        </p:cTn>
+      </p:par>
+    </p:tnLst>
+    <p:bldLst>
+      <p:bldP spid="2" grpId="0"/>
+      <p:bldP spid="3" grpId="0"/>
+      <p:bldP spid="6" grpId="0"/>
+      <p:bldP spid="9" grpId="0"/>
+      <p:bldP spid="10" grpId="0"/>
+      <p:bldP spid="11" grpId="0"/>
+      <p:bldP spid="15" grpId="0"/>
+    </p:bldLst>
+  </p:timing>
 </p:sld>
 </file>
 
@@ -10029,8 +11564,8 @@
         </p:nvSpPr>
         <p:spPr>
           <a:xfrm>
-            <a:off x="5130039" y="106440"/>
-            <a:ext cx="1931939" cy="923330"/>
+            <a:off x="5365196" y="2606072"/>
+            <a:ext cx="1824537" cy="923330"/>
           </a:xfrm>
           <a:prstGeom prst="rect">
             <a:avLst/>
@@ -10057,169 +11592,11 @@
                     </a:schemeClr>
                   </a:outerShdw>
                 </a:effectLst>
+                <a:latin typeface="Calibri" panose="020F0502020204030204" pitchFamily="34" charset="0"/>
+                <a:cs typeface="Calibri" panose="020F0502020204030204" pitchFamily="34" charset="0"/>
               </a:rPr>
               <a:t>String</a:t>
             </a:r>
-          </a:p>
-        </p:txBody>
-      </p:sp>
-      <p:sp>
-        <p:nvSpPr>
-          <p:cNvPr id="7" name="Rectangle 6">
-            <a:extLst>
-              <a:ext uri="{FF2B5EF4-FFF2-40B4-BE49-F238E27FC236}">
-                <a16:creationId xmlns:a16="http://schemas.microsoft.com/office/drawing/2014/main" id="{A31FD0FC-4D73-191F-70CF-EEAAEFB26936}"/>
-              </a:ext>
-            </a:extLst>
-          </p:cNvPr>
-          <p:cNvSpPr/>
-          <p:nvPr/>
-        </p:nvSpPr>
-        <p:spPr>
-          <a:xfrm>
-            <a:off x="5476061" y="1905506"/>
-            <a:ext cx="4579715" cy="3046988"/>
-          </a:xfrm>
-          <a:prstGeom prst="rect">
-            <a:avLst/>
-          </a:prstGeom>
-          <a:noFill/>
-        </p:spPr>
-        <p:txBody>
-          <a:bodyPr wrap="none" lIns="91440" tIns="45720" rIns="91440" bIns="45720">
-            <a:spAutoFit/>
-          </a:bodyPr>
-          <a:lstStyle/>
-          <a:p>
-            <a:pPr marL="685800" indent="-685800" algn="just">
-              <a:buFont typeface="Arial" panose="020B0604020202020204" pitchFamily="34" charset="0"/>
-              <a:buChar char="•"/>
-            </a:pPr>
-            <a:r>
-              <a:rPr lang="en-US" sz="3200" b="0" cap="none" spc="0" dirty="0">
-                <a:ln w="0"/>
-                <a:solidFill>
-                  <a:schemeClr val="accent1"/>
-                </a:solidFill>
-                <a:effectLst>
-                  <a:outerShdw blurRad="38100" dist="25400" dir="5400000" algn="ctr" rotWithShape="0">
-                    <a:srgbClr val="6E747A">
-                      <a:alpha val="43000"/>
-                    </a:srgbClr>
-                  </a:outerShdw>
-                </a:effectLst>
-              </a:rPr>
-              <a:t>Lists Sets Dictionaries</a:t>
-            </a:r>
-          </a:p>
-          <a:p>
-            <a:pPr marL="685800" indent="-685800" algn="just">
-              <a:buFont typeface="Arial" panose="020B0604020202020204" pitchFamily="34" charset="0"/>
-              <a:buChar char="•"/>
-            </a:pPr>
-            <a:r>
-              <a:rPr lang="en-US" sz="3200" dirty="0">
-                <a:ln w="0"/>
-                <a:solidFill>
-                  <a:schemeClr val="accent1"/>
-                </a:solidFill>
-                <a:effectLst>
-                  <a:outerShdw blurRad="38100" dist="25400" dir="5400000" algn="ctr" rotWithShape="0">
-                    <a:srgbClr val="6E747A">
-                      <a:alpha val="43000"/>
-                    </a:srgbClr>
-                  </a:outerShdw>
-                </a:effectLst>
-              </a:rPr>
-              <a:t>For each loop</a:t>
-            </a:r>
-          </a:p>
-          <a:p>
-            <a:pPr marL="685800" indent="-685800" algn="just">
-              <a:buFont typeface="Arial" panose="020B0604020202020204" pitchFamily="34" charset="0"/>
-              <a:buChar char="•"/>
-            </a:pPr>
-            <a:r>
-              <a:rPr lang="en-US" sz="3200" dirty="0">
-                <a:ln w="0"/>
-                <a:solidFill>
-                  <a:schemeClr val="accent1"/>
-                </a:solidFill>
-                <a:effectLst>
-                  <a:outerShdw blurRad="38100" dist="25400" dir="5400000" algn="ctr" rotWithShape="0">
-                    <a:srgbClr val="6E747A">
-                      <a:alpha val="43000"/>
-                    </a:srgbClr>
-                  </a:outerShdw>
-                </a:effectLst>
-              </a:rPr>
-              <a:t>Functions</a:t>
-            </a:r>
-          </a:p>
-          <a:p>
-            <a:pPr marL="685800" indent="-685800" algn="just">
-              <a:buFont typeface="Arial" panose="020B0604020202020204" pitchFamily="34" charset="0"/>
-              <a:buChar char="•"/>
-            </a:pPr>
-            <a:r>
-              <a:rPr lang="en-US" sz="3200" dirty="0">
-                <a:ln w="0"/>
-                <a:solidFill>
-                  <a:schemeClr val="accent1"/>
-                </a:solidFill>
-                <a:effectLst>
-                  <a:outerShdw blurRad="38100" dist="25400" dir="5400000" algn="ctr" rotWithShape="0">
-                    <a:srgbClr val="6E747A">
-                      <a:alpha val="43000"/>
-                    </a:srgbClr>
-                  </a:outerShdw>
-                </a:effectLst>
-              </a:rPr>
-              <a:t>Parameters</a:t>
-            </a:r>
-          </a:p>
-          <a:p>
-            <a:pPr marL="685800" indent="-685800" algn="just">
-              <a:buFont typeface="Arial" panose="020B0604020202020204" pitchFamily="34" charset="0"/>
-              <a:buChar char="•"/>
-            </a:pPr>
-            <a:r>
-              <a:rPr lang="en-US" sz="3200" b="0" cap="none" spc="0" dirty="0">
-                <a:ln w="0"/>
-                <a:solidFill>
-                  <a:schemeClr val="accent3">
-                    <a:lumMod val="75000"/>
-                  </a:schemeClr>
-                </a:solidFill>
-                <a:effectLst>
-                  <a:outerShdw blurRad="38100" dist="25400" dir="5400000" algn="ctr" rotWithShape="0">
-                    <a:srgbClr val="6E747A">
-                      <a:alpha val="43000"/>
-                    </a:srgbClr>
-                  </a:outerShdw>
-                </a:effectLst>
-              </a:rPr>
-              <a:t>Tic Tac Toe</a:t>
-            </a:r>
-          </a:p>
-          <a:p>
-            <a:pPr marL="685800" indent="-685800" algn="just">
-              <a:buFont typeface="Arial" panose="020B0604020202020204" pitchFamily="34" charset="0"/>
-              <a:buChar char="•"/>
-            </a:pPr>
-            <a:endParaRPr lang="en-US" sz="3200" b="0" cap="none" spc="0" dirty="0">
-              <a:ln w="0"/>
-              <a:solidFill>
-                <a:schemeClr val="accent1"/>
-              </a:solidFill>
-              <a:effectLst>
-                <a:outerShdw blurRad="38100" dist="25400" dir="5400000" algn="ctr" rotWithShape="0">
-                  <a:srgbClr val="6E747A">
-                    <a:alpha val="43000"/>
-                  </a:srgbClr>
-                </a:outerShdw>
-              </a:effectLst>
-            </a:endParaRPr>
           </a:p>
         </p:txBody>
       </p:sp>
@@ -10271,6 +11648,482 @@
           </a:p>
         </p:txBody>
       </p:sp>
+      <p:sp>
+        <p:nvSpPr>
+          <p:cNvPr id="2" name="Rectangle 1">
+            <a:extLst>
+              <a:ext uri="{FF2B5EF4-FFF2-40B4-BE49-F238E27FC236}">
+                <a16:creationId xmlns:a16="http://schemas.microsoft.com/office/drawing/2014/main" id="{5AC93A37-7D62-B62D-5449-010BD24FE861}"/>
+              </a:ext>
+            </a:extLst>
+          </p:cNvPr>
+          <p:cNvSpPr/>
+          <p:nvPr/>
+        </p:nvSpPr>
+        <p:spPr>
+          <a:xfrm>
+            <a:off x="4070302" y="1711182"/>
+            <a:ext cx="527709" cy="584775"/>
+          </a:xfrm>
+          <a:prstGeom prst="rect">
+            <a:avLst/>
+          </a:prstGeom>
+          <a:noFill/>
+        </p:spPr>
+        <p:txBody>
+          <a:bodyPr wrap="none" lIns="91440" tIns="45720" rIns="91440" bIns="45720">
+            <a:spAutoFit/>
+          </a:bodyPr>
+          <a:lstStyle/>
+          <a:p>
+            <a:pPr algn="just"/>
+            <a:r>
+              <a:rPr lang="en-US" sz="3200" dirty="0">
+                <a:ln w="0"/>
+                <a:solidFill>
+                  <a:schemeClr val="accent1"/>
+                </a:solidFill>
+                <a:effectLst>
+                  <a:outerShdw blurRad="38100" dist="25400" dir="5400000" algn="ctr" rotWithShape="0">
+                    <a:srgbClr val="6E747A">
+                      <a:alpha val="43000"/>
+                    </a:srgbClr>
+                  </a:outerShdw>
+                </a:effectLst>
+                <a:latin typeface="Calibri" panose="020F0502020204030204" pitchFamily="34" charset="0"/>
+                <a:cs typeface="Calibri" panose="020F0502020204030204" pitchFamily="34" charset="0"/>
+              </a:rPr>
+              <a:t>“”</a:t>
+            </a:r>
+            <a:endParaRPr lang="en-US" sz="3200" b="0" cap="none" spc="0" dirty="0">
+              <a:ln w="0"/>
+              <a:solidFill>
+                <a:schemeClr val="accent1"/>
+              </a:solidFill>
+              <a:effectLst>
+                <a:outerShdw blurRad="38100" dist="25400" dir="5400000" algn="ctr" rotWithShape="0">
+                  <a:srgbClr val="6E747A">
+                    <a:alpha val="43000"/>
+                  </a:srgbClr>
+                </a:outerShdw>
+              </a:effectLst>
+              <a:latin typeface="Calibri" panose="020F0502020204030204" pitchFamily="34" charset="0"/>
+              <a:cs typeface="Calibri" panose="020F0502020204030204" pitchFamily="34" charset="0"/>
+            </a:endParaRPr>
+          </a:p>
+        </p:txBody>
+      </p:sp>
+      <p:sp>
+        <p:nvSpPr>
+          <p:cNvPr id="3" name="Rectangle 2">
+            <a:extLst>
+              <a:ext uri="{FF2B5EF4-FFF2-40B4-BE49-F238E27FC236}">
+                <a16:creationId xmlns:a16="http://schemas.microsoft.com/office/drawing/2014/main" id="{7A9CA3BC-9557-651F-3858-1B91F234CF62}"/>
+              </a:ext>
+            </a:extLst>
+          </p:cNvPr>
+          <p:cNvSpPr/>
+          <p:nvPr/>
+        </p:nvSpPr>
+        <p:spPr>
+          <a:xfrm>
+            <a:off x="7593991" y="1711181"/>
+            <a:ext cx="1530804" cy="584775"/>
+          </a:xfrm>
+          <a:prstGeom prst="rect">
+            <a:avLst/>
+          </a:prstGeom>
+          <a:noFill/>
+        </p:spPr>
+        <p:txBody>
+          <a:bodyPr wrap="none" lIns="91440" tIns="45720" rIns="91440" bIns="45720">
+            <a:spAutoFit/>
+          </a:bodyPr>
+          <a:lstStyle/>
+          <a:p>
+            <a:pPr algn="just"/>
+            <a:r>
+              <a:rPr lang="en-US" sz="3200" dirty="0">
+                <a:ln w="0"/>
+                <a:solidFill>
+                  <a:schemeClr val="accent1"/>
+                </a:solidFill>
+                <a:effectLst>
+                  <a:outerShdw blurRad="38100" dist="25400" dir="5400000" algn="ctr" rotWithShape="0">
+                    <a:srgbClr val="6E747A">
+                      <a:alpha val="43000"/>
+                    </a:srgbClr>
+                  </a:outerShdw>
+                </a:effectLst>
+                <a:latin typeface="Calibri" panose="020F0502020204030204" pitchFamily="34" charset="0"/>
+                <a:cs typeface="Calibri" panose="020F0502020204030204" pitchFamily="34" charset="0"/>
+              </a:rPr>
+              <a:t>“James”</a:t>
+            </a:r>
+            <a:endParaRPr lang="en-US" sz="3200" b="0" cap="none" spc="0" dirty="0">
+              <a:ln w="0"/>
+              <a:solidFill>
+                <a:schemeClr val="accent1"/>
+              </a:solidFill>
+              <a:effectLst>
+                <a:outerShdw blurRad="38100" dist="25400" dir="5400000" algn="ctr" rotWithShape="0">
+                  <a:srgbClr val="6E747A">
+                    <a:alpha val="43000"/>
+                  </a:srgbClr>
+                </a:outerShdw>
+              </a:effectLst>
+              <a:latin typeface="Calibri" panose="020F0502020204030204" pitchFamily="34" charset="0"/>
+              <a:cs typeface="Calibri" panose="020F0502020204030204" pitchFamily="34" charset="0"/>
+            </a:endParaRPr>
+          </a:p>
+        </p:txBody>
+      </p:sp>
+      <p:sp>
+        <p:nvSpPr>
+          <p:cNvPr id="6" name="Rectangle 5">
+            <a:extLst>
+              <a:ext uri="{FF2B5EF4-FFF2-40B4-BE49-F238E27FC236}">
+                <a16:creationId xmlns:a16="http://schemas.microsoft.com/office/drawing/2014/main" id="{48C5174A-6A93-1595-0A9D-BCE0DC36A573}"/>
+              </a:ext>
+            </a:extLst>
+          </p:cNvPr>
+          <p:cNvSpPr/>
+          <p:nvPr/>
+        </p:nvSpPr>
+        <p:spPr>
+          <a:xfrm>
+            <a:off x="3373637" y="3899515"/>
+            <a:ext cx="1393330" cy="584775"/>
+          </a:xfrm>
+          <a:prstGeom prst="rect">
+            <a:avLst/>
+          </a:prstGeom>
+          <a:noFill/>
+        </p:spPr>
+        <p:txBody>
+          <a:bodyPr wrap="none" lIns="91440" tIns="45720" rIns="91440" bIns="45720">
+            <a:spAutoFit/>
+          </a:bodyPr>
+          <a:lstStyle/>
+          <a:p>
+            <a:pPr algn="just"/>
+            <a:r>
+              <a:rPr lang="en-US" sz="3200" dirty="0">
+                <a:ln w="0"/>
+                <a:solidFill>
+                  <a:schemeClr val="accent1"/>
+                </a:solidFill>
+                <a:effectLst>
+                  <a:outerShdw blurRad="38100" dist="25400" dir="5400000" algn="ctr" rotWithShape="0">
+                    <a:srgbClr val="6E747A">
+                      <a:alpha val="43000"/>
+                    </a:srgbClr>
+                  </a:outerShdw>
+                </a:effectLst>
+                <a:latin typeface="Calibri" panose="020F0502020204030204" pitchFamily="34" charset="0"/>
+                <a:cs typeface="Calibri" panose="020F0502020204030204" pitchFamily="34" charset="0"/>
+              </a:rPr>
+              <a:t>“Hello”</a:t>
+            </a:r>
+            <a:endParaRPr lang="en-US" sz="3200" b="0" cap="none" spc="0" dirty="0">
+              <a:ln w="0"/>
+              <a:solidFill>
+                <a:schemeClr val="accent1"/>
+              </a:solidFill>
+              <a:effectLst>
+                <a:outerShdw blurRad="38100" dist="25400" dir="5400000" algn="ctr" rotWithShape="0">
+                  <a:srgbClr val="6E747A">
+                    <a:alpha val="43000"/>
+                  </a:srgbClr>
+                </a:outerShdw>
+              </a:effectLst>
+              <a:latin typeface="Calibri" panose="020F0502020204030204" pitchFamily="34" charset="0"/>
+              <a:cs typeface="Calibri" panose="020F0502020204030204" pitchFamily="34" charset="0"/>
+            </a:endParaRPr>
+          </a:p>
+        </p:txBody>
+      </p:sp>
+      <p:sp>
+        <p:nvSpPr>
+          <p:cNvPr id="9" name="Rectangle 8">
+            <a:extLst>
+              <a:ext uri="{FF2B5EF4-FFF2-40B4-BE49-F238E27FC236}">
+                <a16:creationId xmlns:a16="http://schemas.microsoft.com/office/drawing/2014/main" id="{9F797BD8-6CAA-7DD1-8E8E-071071BBE6AA}"/>
+              </a:ext>
+            </a:extLst>
+          </p:cNvPr>
+          <p:cNvSpPr/>
+          <p:nvPr/>
+        </p:nvSpPr>
+        <p:spPr>
+          <a:xfrm>
+            <a:off x="6439196" y="4124586"/>
+            <a:ext cx="5192967" cy="1631216"/>
+          </a:xfrm>
+          <a:prstGeom prst="rect">
+            <a:avLst/>
+          </a:prstGeom>
+          <a:noFill/>
+        </p:spPr>
+        <p:txBody>
+          <a:bodyPr wrap="square" lIns="91440" tIns="45720" rIns="91440" bIns="45720">
+            <a:spAutoFit/>
+          </a:bodyPr>
+          <a:lstStyle/>
+          <a:p>
+            <a:pPr algn="just"/>
+            <a:r>
+              <a:rPr lang="en-US" sz="2000" dirty="0">
+                <a:ln w="0"/>
+                <a:solidFill>
+                  <a:schemeClr val="accent1"/>
+                </a:solidFill>
+                <a:effectLst>
+                  <a:outerShdw blurRad="38100" dist="25400" dir="5400000" algn="ctr" rotWithShape="0">
+                    <a:srgbClr val="6E747A">
+                      <a:alpha val="43000"/>
+                    </a:srgbClr>
+                  </a:outerShdw>
+                </a:effectLst>
+                <a:latin typeface="Calibri" panose="020F0502020204030204" pitchFamily="34" charset="0"/>
+                <a:cs typeface="Calibri" panose="020F0502020204030204" pitchFamily="34" charset="0"/>
+              </a:rPr>
+              <a:t>“</a:t>
+            </a:r>
+            <a:r>
+              <a:rPr lang="en-GB" sz="2000" dirty="0">
+                <a:ln w="0"/>
+                <a:solidFill>
+                  <a:schemeClr val="accent1"/>
+                </a:solidFill>
+                <a:effectLst>
+                  <a:outerShdw blurRad="38100" dist="25400" dir="5400000" algn="ctr" rotWithShape="0">
+                    <a:srgbClr val="6E747A">
+                      <a:alpha val="43000"/>
+                    </a:srgbClr>
+                  </a:outerShdw>
+                </a:effectLst>
+                <a:latin typeface="Calibri" panose="020F0502020204030204" pitchFamily="34" charset="0"/>
+                <a:cs typeface="Calibri" panose="020F0502020204030204" pitchFamily="34" charset="0"/>
+              </a:rPr>
+              <a:t>Python is a high-level, general-purpose programming language. Its design philosophy emphasizes code readability with the use of significant indentation. Python is dynamically typed and garbage-collected.</a:t>
+            </a:r>
+            <a:r>
+              <a:rPr lang="en-US" sz="2000" dirty="0">
+                <a:ln w="0"/>
+                <a:solidFill>
+                  <a:schemeClr val="accent1"/>
+                </a:solidFill>
+                <a:effectLst>
+                  <a:outerShdw blurRad="38100" dist="25400" dir="5400000" algn="ctr" rotWithShape="0">
+                    <a:srgbClr val="6E747A">
+                      <a:alpha val="43000"/>
+                    </a:srgbClr>
+                  </a:outerShdw>
+                </a:effectLst>
+                <a:latin typeface="Calibri" panose="020F0502020204030204" pitchFamily="34" charset="0"/>
+                <a:cs typeface="Calibri" panose="020F0502020204030204" pitchFamily="34" charset="0"/>
+              </a:rPr>
+              <a:t>”</a:t>
+            </a:r>
+            <a:endParaRPr lang="en-US" sz="2000" b="0" cap="none" spc="0" dirty="0">
+              <a:ln w="0"/>
+              <a:solidFill>
+                <a:schemeClr val="accent1"/>
+              </a:solidFill>
+              <a:effectLst>
+                <a:outerShdw blurRad="38100" dist="25400" dir="5400000" algn="ctr" rotWithShape="0">
+                  <a:srgbClr val="6E747A">
+                    <a:alpha val="43000"/>
+                  </a:srgbClr>
+                </a:outerShdw>
+              </a:effectLst>
+              <a:latin typeface="Calibri" panose="020F0502020204030204" pitchFamily="34" charset="0"/>
+              <a:cs typeface="Calibri" panose="020F0502020204030204" pitchFamily="34" charset="0"/>
+            </a:endParaRPr>
+          </a:p>
+        </p:txBody>
+      </p:sp>
+      <p:cxnSp>
+        <p:nvCxnSpPr>
+          <p:cNvPr id="10" name="Straight Connector 9">
+            <a:extLst>
+              <a:ext uri="{FF2B5EF4-FFF2-40B4-BE49-F238E27FC236}">
+                <a16:creationId xmlns:a16="http://schemas.microsoft.com/office/drawing/2014/main" id="{773F0D55-9640-4286-AD01-547BBA556468}"/>
+              </a:ext>
+            </a:extLst>
+          </p:cNvPr>
+          <p:cNvCxnSpPr>
+            <a:cxnSpLocks/>
+          </p:cNvCxnSpPr>
+          <p:nvPr/>
+        </p:nvCxnSpPr>
+        <p:spPr>
+          <a:xfrm flipH="1" flipV="1">
+            <a:off x="4646645" y="2152261"/>
+            <a:ext cx="718551" cy="553617"/>
+          </a:xfrm>
+          <a:prstGeom prst="line">
+            <a:avLst/>
+          </a:prstGeom>
+          <a:ln w="76200">
+            <a:solidFill>
+              <a:schemeClr val="accent1">
+                <a:lumMod val="50000"/>
+              </a:schemeClr>
+            </a:solidFill>
+          </a:ln>
+        </p:spPr>
+        <p:style>
+          <a:lnRef idx="1">
+            <a:schemeClr val="accent1"/>
+          </a:lnRef>
+          <a:fillRef idx="0">
+            <a:schemeClr val="accent1"/>
+          </a:fillRef>
+          <a:effectRef idx="0">
+            <a:schemeClr val="accent1"/>
+          </a:effectRef>
+          <a:fontRef idx="minor">
+            <a:schemeClr val="tx1"/>
+          </a:fontRef>
+        </p:style>
+      </p:cxnSp>
+      <p:cxnSp>
+        <p:nvCxnSpPr>
+          <p:cNvPr id="13" name="Straight Connector 12">
+            <a:extLst>
+              <a:ext uri="{FF2B5EF4-FFF2-40B4-BE49-F238E27FC236}">
+                <a16:creationId xmlns:a16="http://schemas.microsoft.com/office/drawing/2014/main" id="{DB71402B-C84E-528E-9C8F-CC94D842885A}"/>
+              </a:ext>
+            </a:extLst>
+          </p:cNvPr>
+          <p:cNvCxnSpPr>
+            <a:cxnSpLocks/>
+          </p:cNvCxnSpPr>
+          <p:nvPr/>
+        </p:nvCxnSpPr>
+        <p:spPr>
+          <a:xfrm flipV="1">
+            <a:off x="4766967" y="3346580"/>
+            <a:ext cx="598229" cy="543327"/>
+          </a:xfrm>
+          <a:prstGeom prst="line">
+            <a:avLst/>
+          </a:prstGeom>
+          <a:ln w="76200">
+            <a:solidFill>
+              <a:schemeClr val="accent1">
+                <a:lumMod val="50000"/>
+              </a:schemeClr>
+            </a:solidFill>
+          </a:ln>
+        </p:spPr>
+        <p:style>
+          <a:lnRef idx="1">
+            <a:schemeClr val="accent1"/>
+          </a:lnRef>
+          <a:fillRef idx="0">
+            <a:schemeClr val="accent1"/>
+          </a:fillRef>
+          <a:effectRef idx="0">
+            <a:schemeClr val="accent1"/>
+          </a:effectRef>
+          <a:fontRef idx="minor">
+            <a:schemeClr val="tx1"/>
+          </a:fontRef>
+        </p:style>
+      </p:cxnSp>
+      <p:cxnSp>
+        <p:nvCxnSpPr>
+          <p:cNvPr id="17" name="Straight Connector 16">
+            <a:extLst>
+              <a:ext uri="{FF2B5EF4-FFF2-40B4-BE49-F238E27FC236}">
+                <a16:creationId xmlns:a16="http://schemas.microsoft.com/office/drawing/2014/main" id="{B2617AE1-806E-8280-2F08-C228F0CDDC51}"/>
+              </a:ext>
+            </a:extLst>
+          </p:cNvPr>
+          <p:cNvCxnSpPr>
+            <a:cxnSpLocks/>
+          </p:cNvCxnSpPr>
+          <p:nvPr/>
+        </p:nvCxnSpPr>
+        <p:spPr>
+          <a:xfrm flipV="1">
+            <a:off x="7189733" y="2245567"/>
+            <a:ext cx="513278" cy="559837"/>
+          </a:xfrm>
+          <a:prstGeom prst="line">
+            <a:avLst/>
+          </a:prstGeom>
+          <a:ln w="76200">
+            <a:solidFill>
+              <a:schemeClr val="accent1">
+                <a:lumMod val="50000"/>
+              </a:schemeClr>
+            </a:solidFill>
+          </a:ln>
+        </p:spPr>
+        <p:style>
+          <a:lnRef idx="1">
+            <a:schemeClr val="accent1"/>
+          </a:lnRef>
+          <a:fillRef idx="0">
+            <a:schemeClr val="accent1"/>
+          </a:fillRef>
+          <a:effectRef idx="0">
+            <a:schemeClr val="accent1"/>
+          </a:effectRef>
+          <a:fontRef idx="minor">
+            <a:schemeClr val="tx1"/>
+          </a:fontRef>
+        </p:style>
+      </p:cxnSp>
+      <p:cxnSp>
+        <p:nvCxnSpPr>
+          <p:cNvPr id="20" name="Straight Connector 19">
+            <a:extLst>
+              <a:ext uri="{FF2B5EF4-FFF2-40B4-BE49-F238E27FC236}">
+                <a16:creationId xmlns:a16="http://schemas.microsoft.com/office/drawing/2014/main" id="{48D42B20-41F1-E340-090C-B9865D641313}"/>
+              </a:ext>
+            </a:extLst>
+          </p:cNvPr>
+          <p:cNvCxnSpPr>
+            <a:cxnSpLocks/>
+          </p:cNvCxnSpPr>
+          <p:nvPr/>
+        </p:nvCxnSpPr>
+        <p:spPr>
+          <a:xfrm>
+            <a:off x="7189733" y="3429000"/>
+            <a:ext cx="598229" cy="554213"/>
+          </a:xfrm>
+          <a:prstGeom prst="line">
+            <a:avLst/>
+          </a:prstGeom>
+          <a:ln w="76200">
+            <a:solidFill>
+              <a:schemeClr val="accent1">
+                <a:lumMod val="50000"/>
+              </a:schemeClr>
+            </a:solidFill>
+          </a:ln>
+        </p:spPr>
+        <p:style>
+          <a:lnRef idx="1">
+            <a:schemeClr val="accent1"/>
+          </a:lnRef>
+          <a:fillRef idx="0">
+            <a:schemeClr val="accent1"/>
+          </a:fillRef>
+          <a:effectRef idx="0">
+            <a:schemeClr val="accent1"/>
+          </a:effectRef>
+          <a:fontRef idx="minor">
+            <a:schemeClr val="tx1"/>
+          </a:fontRef>
+        </p:style>
+      </p:cxnSp>
     </p:spTree>
     <p:extLst>
       <p:ext uri="{BB962C8B-B14F-4D97-AF65-F5344CB8AC3E}">
@@ -10281,6 +12134,276 @@
   <p:clrMapOvr>
     <a:masterClrMapping/>
   </p:clrMapOvr>
+  <p:timing>
+    <p:tnLst>
+      <p:par>
+        <p:cTn id="1" dur="indefinite" restart="never" nodeType="tmRoot">
+          <p:childTnLst>
+            <p:seq concurrent="1" nextAc="seek">
+              <p:cTn id="2" dur="indefinite" nodeType="mainSeq">
+                <p:childTnLst>
+                  <p:par>
+                    <p:cTn id="3" fill="hold">
+                      <p:stCondLst>
+                        <p:cond delay="indefinite"/>
+                      </p:stCondLst>
+                      <p:childTnLst>
+                        <p:par>
+                          <p:cTn id="4" fill="hold">
+                            <p:stCondLst>
+                              <p:cond delay="0"/>
+                            </p:stCondLst>
+                            <p:childTnLst>
+                              <p:par>
+                                <p:cTn id="5" presetID="1" presetClass="entr" presetSubtype="0" fill="hold" grpId="0" nodeType="clickEffect">
+                                  <p:stCondLst>
+                                    <p:cond delay="0"/>
+                                  </p:stCondLst>
+                                  <p:childTnLst>
+                                    <p:set>
+                                      <p:cBhvr>
+                                        <p:cTn id="6" dur="1" fill="hold">
+                                          <p:stCondLst>
+                                            <p:cond delay="0"/>
+                                          </p:stCondLst>
+                                        </p:cTn>
+                                        <p:tgtEl>
+                                          <p:spTgt spid="2"/>
+                                        </p:tgtEl>
+                                        <p:attrNameLst>
+                                          <p:attrName>style.visibility</p:attrName>
+                                        </p:attrNameLst>
+                                      </p:cBhvr>
+                                      <p:to>
+                                        <p:strVal val="visible"/>
+                                      </p:to>
+                                    </p:set>
+                                  </p:childTnLst>
+                                </p:cTn>
+                              </p:par>
+                              <p:par>
+                                <p:cTn id="7" presetID="1" presetClass="entr" presetSubtype="0" fill="hold" grpId="0" nodeType="withEffect">
+                                  <p:stCondLst>
+                                    <p:cond delay="0"/>
+                                  </p:stCondLst>
+                                  <p:childTnLst>
+                                    <p:set>
+                                      <p:cBhvr>
+                                        <p:cTn id="8" dur="1" fill="hold">
+                                          <p:stCondLst>
+                                            <p:cond delay="0"/>
+                                          </p:stCondLst>
+                                        </p:cTn>
+                                        <p:tgtEl>
+                                          <p:spTgt spid="3"/>
+                                        </p:tgtEl>
+                                        <p:attrNameLst>
+                                          <p:attrName>style.visibility</p:attrName>
+                                        </p:attrNameLst>
+                                      </p:cBhvr>
+                                      <p:to>
+                                        <p:strVal val="visible"/>
+                                      </p:to>
+                                    </p:set>
+                                  </p:childTnLst>
+                                </p:cTn>
+                              </p:par>
+                              <p:par>
+                                <p:cTn id="9" presetID="1" presetClass="entr" presetSubtype="0" fill="hold" grpId="0" nodeType="withEffect">
+                                  <p:stCondLst>
+                                    <p:cond delay="0"/>
+                                  </p:stCondLst>
+                                  <p:childTnLst>
+                                    <p:set>
+                                      <p:cBhvr>
+                                        <p:cTn id="10" dur="1" fill="hold">
+                                          <p:stCondLst>
+                                            <p:cond delay="0"/>
+                                          </p:stCondLst>
+                                        </p:cTn>
+                                        <p:tgtEl>
+                                          <p:spTgt spid="6"/>
+                                        </p:tgtEl>
+                                        <p:attrNameLst>
+                                          <p:attrName>style.visibility</p:attrName>
+                                        </p:attrNameLst>
+                                      </p:cBhvr>
+                                      <p:to>
+                                        <p:strVal val="visible"/>
+                                      </p:to>
+                                    </p:set>
+                                  </p:childTnLst>
+                                </p:cTn>
+                              </p:par>
+                              <p:par>
+                                <p:cTn id="11" presetID="1" presetClass="entr" presetSubtype="0" fill="hold" grpId="0" nodeType="withEffect">
+                                  <p:stCondLst>
+                                    <p:cond delay="0"/>
+                                  </p:stCondLst>
+                                  <p:childTnLst>
+                                    <p:set>
+                                      <p:cBhvr>
+                                        <p:cTn id="12" dur="1" fill="hold">
+                                          <p:stCondLst>
+                                            <p:cond delay="0"/>
+                                          </p:stCondLst>
+                                        </p:cTn>
+                                        <p:tgtEl>
+                                          <p:spTgt spid="9"/>
+                                        </p:tgtEl>
+                                        <p:attrNameLst>
+                                          <p:attrName>style.visibility</p:attrName>
+                                        </p:attrNameLst>
+                                      </p:cBhvr>
+                                      <p:to>
+                                        <p:strVal val="visible"/>
+                                      </p:to>
+                                    </p:set>
+                                  </p:childTnLst>
+                                </p:cTn>
+                              </p:par>
+                              <p:par>
+                                <p:cTn id="13" presetID="1" presetClass="entr" presetSubtype="0" fill="hold" nodeType="withEffect">
+                                  <p:stCondLst>
+                                    <p:cond delay="0"/>
+                                  </p:stCondLst>
+                                  <p:childTnLst>
+                                    <p:set>
+                                      <p:cBhvr>
+                                        <p:cTn id="14" dur="1" fill="hold">
+                                          <p:stCondLst>
+                                            <p:cond delay="0"/>
+                                          </p:stCondLst>
+                                        </p:cTn>
+                                        <p:tgtEl>
+                                          <p:spTgt spid="10"/>
+                                        </p:tgtEl>
+                                        <p:attrNameLst>
+                                          <p:attrName>style.visibility</p:attrName>
+                                        </p:attrNameLst>
+                                      </p:cBhvr>
+                                      <p:to>
+                                        <p:strVal val="visible"/>
+                                      </p:to>
+                                    </p:set>
+                                  </p:childTnLst>
+                                </p:cTn>
+                              </p:par>
+                              <p:par>
+                                <p:cTn id="15" presetID="1" presetClass="entr" presetSubtype="0" fill="hold" nodeType="withEffect">
+                                  <p:stCondLst>
+                                    <p:cond delay="0"/>
+                                  </p:stCondLst>
+                                  <p:childTnLst>
+                                    <p:set>
+                                      <p:cBhvr>
+                                        <p:cTn id="16" dur="1" fill="hold">
+                                          <p:stCondLst>
+                                            <p:cond delay="0"/>
+                                          </p:stCondLst>
+                                        </p:cTn>
+                                        <p:tgtEl>
+                                          <p:spTgt spid="17"/>
+                                        </p:tgtEl>
+                                        <p:attrNameLst>
+                                          <p:attrName>style.visibility</p:attrName>
+                                        </p:attrNameLst>
+                                      </p:cBhvr>
+                                      <p:to>
+                                        <p:strVal val="visible"/>
+                                      </p:to>
+                                    </p:set>
+                                  </p:childTnLst>
+                                </p:cTn>
+                              </p:par>
+                              <p:par>
+                                <p:cTn id="17" presetID="1" presetClass="entr" presetSubtype="0" fill="hold" nodeType="withEffect">
+                                  <p:stCondLst>
+                                    <p:cond delay="0"/>
+                                  </p:stCondLst>
+                                  <p:childTnLst>
+                                    <p:set>
+                                      <p:cBhvr>
+                                        <p:cTn id="18" dur="1" fill="hold">
+                                          <p:stCondLst>
+                                            <p:cond delay="0"/>
+                                          </p:stCondLst>
+                                        </p:cTn>
+                                        <p:tgtEl>
+                                          <p:spTgt spid="20"/>
+                                        </p:tgtEl>
+                                        <p:attrNameLst>
+                                          <p:attrName>style.visibility</p:attrName>
+                                        </p:attrNameLst>
+                                      </p:cBhvr>
+                                      <p:to>
+                                        <p:strVal val="visible"/>
+                                      </p:to>
+                                    </p:set>
+                                  </p:childTnLst>
+                                </p:cTn>
+                              </p:par>
+                              <p:par>
+                                <p:cTn id="19" presetID="1" presetClass="entr" presetSubtype="0" fill="hold" nodeType="withEffect">
+                                  <p:stCondLst>
+                                    <p:cond delay="0"/>
+                                  </p:stCondLst>
+                                  <p:childTnLst>
+                                    <p:set>
+                                      <p:cBhvr>
+                                        <p:cTn id="20" dur="1" fill="hold">
+                                          <p:stCondLst>
+                                            <p:cond delay="0"/>
+                                          </p:stCondLst>
+                                        </p:cTn>
+                                        <p:tgtEl>
+                                          <p:spTgt spid="13"/>
+                                        </p:tgtEl>
+                                        <p:attrNameLst>
+                                          <p:attrName>style.visibility</p:attrName>
+                                        </p:attrNameLst>
+                                      </p:cBhvr>
+                                      <p:to>
+                                        <p:strVal val="visible"/>
+                                      </p:to>
+                                    </p:set>
+                                  </p:childTnLst>
+                                </p:cTn>
+                              </p:par>
+                            </p:childTnLst>
+                          </p:cTn>
+                        </p:par>
+                      </p:childTnLst>
+                    </p:cTn>
+                  </p:par>
+                </p:childTnLst>
+              </p:cTn>
+              <p:prevCondLst>
+                <p:cond evt="onPrev" delay="0">
+                  <p:tgtEl>
+                    <p:sldTgt/>
+                  </p:tgtEl>
+                </p:cond>
+              </p:prevCondLst>
+              <p:nextCondLst>
+                <p:cond evt="onNext" delay="0">
+                  <p:tgtEl>
+                    <p:sldTgt/>
+                  </p:tgtEl>
+                </p:cond>
+              </p:nextCondLst>
+            </p:seq>
+          </p:childTnLst>
+        </p:cTn>
+      </p:par>
+    </p:tnLst>
+    <p:bldLst>
+      <p:bldP spid="2" grpId="0"/>
+      <p:bldP spid="3" grpId="0"/>
+      <p:bldP spid="6" grpId="0"/>
+      <p:bldP spid="9" grpId="0"/>
+    </p:bldLst>
+  </p:timing>
 </p:sld>
 </file>
 
@@ -10363,7 +12486,7 @@
         </p:nvSpPr>
         <p:spPr>
           <a:xfrm>
-            <a:off x="4844703" y="106440"/>
+            <a:off x="5062418" y="2505670"/>
             <a:ext cx="2502609" cy="923330"/>
           </a:xfrm>
           <a:prstGeom prst="rect">
@@ -10388,6 +12511,8 @@
                     </a:schemeClr>
                   </a:outerShdw>
                 </a:effectLst>
+                <a:latin typeface="Calibri" panose="020F0502020204030204" pitchFamily="34" charset="0"/>
+                <a:cs typeface="Calibri" panose="020F0502020204030204" pitchFamily="34" charset="0"/>
               </a:rPr>
               <a:t>b</a:t>
             </a:r>
@@ -10404,6 +12529,8 @@
                     </a:schemeClr>
                   </a:outerShdw>
                 </a:effectLst>
+                <a:latin typeface="Calibri" panose="020F0502020204030204" pitchFamily="34" charset="0"/>
+                <a:cs typeface="Calibri" panose="020F0502020204030204" pitchFamily="34" charset="0"/>
               </a:rPr>
               <a:t>oolean</a:t>
             </a:r>
@@ -10419,189 +12546,9 @@
                   </a:schemeClr>
                 </a:outerShdw>
               </a:effectLst>
+              <a:latin typeface="Calibri" panose="020F0502020204030204" pitchFamily="34" charset="0"/>
+              <a:cs typeface="Calibri" panose="020F0502020204030204" pitchFamily="34" charset="0"/>
             </a:endParaRPr>
-          </a:p>
-        </p:txBody>
-      </p:sp>
-      <p:pic>
-        <p:nvPicPr>
-          <p:cNvPr id="3" name="Picture 2">
-            <a:extLst>
-              <a:ext uri="{FF2B5EF4-FFF2-40B4-BE49-F238E27FC236}">
-                <a16:creationId xmlns:a16="http://schemas.microsoft.com/office/drawing/2014/main" id="{46EDF7F5-F76C-F9FF-737F-3F4067C7D44F}"/>
-              </a:ext>
-            </a:extLst>
-          </p:cNvPr>
-          <p:cNvPicPr>
-            <a:picLocks noChangeAspect="1"/>
-          </p:cNvPicPr>
-          <p:nvPr/>
-        </p:nvPicPr>
-        <p:blipFill>
-          <a:blip r:embed="rId2">
-            <a:extLst>
-              <a:ext uri="{28A0092B-C50C-407E-A947-70E740481C1C}">
-                <a14:useLocalDpi xmlns:a14="http://schemas.microsoft.com/office/drawing/2010/main" val="0"/>
-              </a:ext>
-            </a:extLst>
-          </a:blip>
-          <a:stretch>
-            <a:fillRect/>
-          </a:stretch>
-        </p:blipFill>
-        <p:spPr>
-          <a:xfrm>
-            <a:off x="8872254" y="1612232"/>
-            <a:ext cx="2666029" cy="3993732"/>
-          </a:xfrm>
-          <a:prstGeom prst="rect">
-            <a:avLst/>
-          </a:prstGeom>
-        </p:spPr>
-      </p:pic>
-      <p:sp>
-        <p:nvSpPr>
-          <p:cNvPr id="6" name="Rectangle 5">
-            <a:extLst>
-              <a:ext uri="{FF2B5EF4-FFF2-40B4-BE49-F238E27FC236}">
-                <a16:creationId xmlns:a16="http://schemas.microsoft.com/office/drawing/2014/main" id="{53454CF4-0D7D-FF22-E3A6-9EC0AD315008}"/>
-              </a:ext>
-            </a:extLst>
-          </p:cNvPr>
-          <p:cNvSpPr/>
-          <p:nvPr/>
-        </p:nvSpPr>
-        <p:spPr>
-          <a:xfrm>
-            <a:off x="2868737" y="1937084"/>
-            <a:ext cx="5004896" cy="923330"/>
-          </a:xfrm>
-          <a:prstGeom prst="rect">
-            <a:avLst/>
-          </a:prstGeom>
-          <a:noFill/>
-        </p:spPr>
-        <p:txBody>
-          <a:bodyPr wrap="none" lIns="91440" tIns="45720" rIns="91440" bIns="45720">
-            <a:spAutoFit/>
-          </a:bodyPr>
-          <a:lstStyle/>
-          <a:p>
-            <a:pPr algn="ctr"/>
-            <a:r>
-              <a:rPr lang="en-US" sz="5400" b="0" cap="none" spc="0" dirty="0">
-                <a:ln w="0"/>
-                <a:solidFill>
-                  <a:schemeClr val="accent1"/>
-                </a:solidFill>
-                <a:effectLst>
-                  <a:outerShdw blurRad="38100" dist="25400" dir="5400000" algn="ctr" rotWithShape="0">
-                    <a:srgbClr val="6E747A">
-                      <a:alpha val="43000"/>
-                    </a:srgbClr>
-                  </a:outerShdw>
-                </a:effectLst>
-              </a:rPr>
-              <a:t>OO programing?</a:t>
-            </a:r>
-          </a:p>
-        </p:txBody>
-      </p:sp>
-      <p:sp>
-        <p:nvSpPr>
-          <p:cNvPr id="8" name="Rectangle 7">
-            <a:extLst>
-              <a:ext uri="{FF2B5EF4-FFF2-40B4-BE49-F238E27FC236}">
-                <a16:creationId xmlns:a16="http://schemas.microsoft.com/office/drawing/2014/main" id="{4790F762-1ED3-9B39-DE6B-C80903501F1C}"/>
-              </a:ext>
-            </a:extLst>
-          </p:cNvPr>
-          <p:cNvSpPr/>
-          <p:nvPr/>
-        </p:nvSpPr>
-        <p:spPr>
-          <a:xfrm>
-            <a:off x="4170212" y="2967335"/>
-            <a:ext cx="2961068" cy="923330"/>
-          </a:xfrm>
-          <a:prstGeom prst="rect">
-            <a:avLst/>
-          </a:prstGeom>
-          <a:noFill/>
-        </p:spPr>
-        <p:txBody>
-          <a:bodyPr wrap="none" lIns="91440" tIns="45720" rIns="91440" bIns="45720">
-            <a:spAutoFit/>
-          </a:bodyPr>
-          <a:lstStyle/>
-          <a:p>
-            <a:pPr algn="ctr"/>
-            <a:r>
-              <a:rPr lang="en-US" sz="5400" b="0" cap="none" spc="0" dirty="0">
-                <a:ln w="0"/>
-                <a:solidFill>
-                  <a:schemeClr val="accent1"/>
-                </a:solidFill>
-                <a:effectLst>
-                  <a:outerShdw blurRad="38100" dist="25400" dir="5400000" algn="ctr" rotWithShape="0">
-                    <a:srgbClr val="6E747A">
-                      <a:alpha val="43000"/>
-                    </a:srgbClr>
-                  </a:outerShdw>
-                </a:effectLst>
-              </a:rPr>
-              <a:t>Libraries?</a:t>
-            </a:r>
-          </a:p>
-        </p:txBody>
-      </p:sp>
-      <p:sp>
-        <p:nvSpPr>
-          <p:cNvPr id="9" name="Rectangle 8">
-            <a:extLst>
-              <a:ext uri="{FF2B5EF4-FFF2-40B4-BE49-F238E27FC236}">
-                <a16:creationId xmlns:a16="http://schemas.microsoft.com/office/drawing/2014/main" id="{DC5F5E89-EA4C-ED0C-B415-2E0C94CC8FD3}"/>
-              </a:ext>
-            </a:extLst>
-          </p:cNvPr>
-          <p:cNvSpPr/>
-          <p:nvPr/>
-        </p:nvSpPr>
-        <p:spPr>
-          <a:xfrm>
-            <a:off x="4662762" y="3890665"/>
-            <a:ext cx="2215671" cy="923330"/>
-          </a:xfrm>
-          <a:prstGeom prst="rect">
-            <a:avLst/>
-          </a:prstGeom>
-          <a:noFill/>
-        </p:spPr>
-        <p:txBody>
-          <a:bodyPr wrap="none" lIns="91440" tIns="45720" rIns="91440" bIns="45720">
-            <a:spAutoFit/>
-          </a:bodyPr>
-          <a:lstStyle/>
-          <a:p>
-            <a:pPr algn="ctr"/>
-            <a:r>
-              <a:rPr lang="en-US" sz="5400" b="0" cap="none" spc="0" dirty="0">
-                <a:ln w="0"/>
-                <a:solidFill>
-                  <a:schemeClr val="accent3">
-                    <a:lumMod val="75000"/>
-                  </a:schemeClr>
-                </a:solidFill>
-                <a:effectLst>
-                  <a:outerShdw blurRad="38100" dist="25400" dir="5400000" algn="ctr" rotWithShape="0">
-                    <a:srgbClr val="6E747A">
-                      <a:alpha val="43000"/>
-                    </a:srgbClr>
-                  </a:outerShdw>
-                </a:effectLst>
-              </a:rPr>
-              <a:t>Quest?</a:t>
-            </a:r>
           </a:p>
         </p:txBody>
       </p:sp>
@@ -10653,6 +12600,226 @@
           </a:p>
         </p:txBody>
       </p:sp>
+      <p:sp>
+        <p:nvSpPr>
+          <p:cNvPr id="7" name="Rectangle 6">
+            <a:extLst>
+              <a:ext uri="{FF2B5EF4-FFF2-40B4-BE49-F238E27FC236}">
+                <a16:creationId xmlns:a16="http://schemas.microsoft.com/office/drawing/2014/main" id="{9C4B9B94-4258-C13D-46AD-EEEDB688D311}"/>
+              </a:ext>
+            </a:extLst>
+          </p:cNvPr>
+          <p:cNvSpPr/>
+          <p:nvPr/>
+        </p:nvSpPr>
+        <p:spPr>
+          <a:xfrm>
+            <a:off x="3004486" y="2600699"/>
+            <a:ext cx="1018420" cy="584775"/>
+          </a:xfrm>
+          <a:prstGeom prst="rect">
+            <a:avLst/>
+          </a:prstGeom>
+          <a:noFill/>
+        </p:spPr>
+        <p:txBody>
+          <a:bodyPr wrap="none" lIns="91440" tIns="45720" rIns="91440" bIns="45720">
+            <a:spAutoFit/>
+          </a:bodyPr>
+          <a:lstStyle/>
+          <a:p>
+            <a:pPr algn="just"/>
+            <a:r>
+              <a:rPr lang="en-US" sz="3200" dirty="0">
+                <a:ln w="0"/>
+                <a:solidFill>
+                  <a:schemeClr val="accent1"/>
+                </a:solidFill>
+                <a:effectLst>
+                  <a:outerShdw blurRad="38100" dist="25400" dir="5400000" algn="ctr" rotWithShape="0">
+                    <a:srgbClr val="6E747A">
+                      <a:alpha val="43000"/>
+                    </a:srgbClr>
+                  </a:outerShdw>
+                </a:effectLst>
+                <a:latin typeface="Calibri" panose="020F0502020204030204" pitchFamily="34" charset="0"/>
+                <a:cs typeface="Calibri" panose="020F0502020204030204" pitchFamily="34" charset="0"/>
+              </a:rPr>
+              <a:t>False</a:t>
+            </a:r>
+            <a:endParaRPr lang="en-US" sz="3200" b="0" cap="none" spc="0" dirty="0">
+              <a:ln w="0"/>
+              <a:solidFill>
+                <a:schemeClr val="accent1"/>
+              </a:solidFill>
+              <a:effectLst>
+                <a:outerShdw blurRad="38100" dist="25400" dir="5400000" algn="ctr" rotWithShape="0">
+                  <a:srgbClr val="6E747A">
+                    <a:alpha val="43000"/>
+                  </a:srgbClr>
+                </a:outerShdw>
+              </a:effectLst>
+              <a:latin typeface="Calibri" panose="020F0502020204030204" pitchFamily="34" charset="0"/>
+              <a:cs typeface="Calibri" panose="020F0502020204030204" pitchFamily="34" charset="0"/>
+            </a:endParaRPr>
+          </a:p>
+        </p:txBody>
+      </p:sp>
+      <p:cxnSp>
+        <p:nvCxnSpPr>
+          <p:cNvPr id="10" name="Straight Connector 9">
+            <a:extLst>
+              <a:ext uri="{FF2B5EF4-FFF2-40B4-BE49-F238E27FC236}">
+                <a16:creationId xmlns:a16="http://schemas.microsoft.com/office/drawing/2014/main" id="{C03113F8-C0B5-1C4B-8176-357C94F3428F}"/>
+              </a:ext>
+            </a:extLst>
+          </p:cNvPr>
+          <p:cNvCxnSpPr>
+            <a:cxnSpLocks/>
+          </p:cNvCxnSpPr>
+          <p:nvPr/>
+        </p:nvCxnSpPr>
+        <p:spPr>
+          <a:xfrm flipH="1" flipV="1">
+            <a:off x="4116058" y="2967335"/>
+            <a:ext cx="895739" cy="49763"/>
+          </a:xfrm>
+          <a:prstGeom prst="line">
+            <a:avLst/>
+          </a:prstGeom>
+          <a:ln w="76200">
+            <a:solidFill>
+              <a:schemeClr val="accent1">
+                <a:lumMod val="50000"/>
+              </a:schemeClr>
+            </a:solidFill>
+          </a:ln>
+        </p:spPr>
+        <p:style>
+          <a:lnRef idx="1">
+            <a:schemeClr val="accent1"/>
+          </a:lnRef>
+          <a:fillRef idx="0">
+            <a:schemeClr val="accent1"/>
+          </a:fillRef>
+          <a:effectRef idx="0">
+            <a:schemeClr val="accent1"/>
+          </a:effectRef>
+          <a:fontRef idx="minor">
+            <a:schemeClr val="tx1"/>
+          </a:fontRef>
+        </p:style>
+      </p:cxnSp>
+      <p:sp>
+        <p:nvSpPr>
+          <p:cNvPr id="16" name="Rectangle 15">
+            <a:extLst>
+              <a:ext uri="{FF2B5EF4-FFF2-40B4-BE49-F238E27FC236}">
+                <a16:creationId xmlns:a16="http://schemas.microsoft.com/office/drawing/2014/main" id="{E82E0618-8EEA-F256-67D4-B61F7183679B}"/>
+              </a:ext>
+            </a:extLst>
+          </p:cNvPr>
+          <p:cNvSpPr/>
+          <p:nvPr/>
+        </p:nvSpPr>
+        <p:spPr>
+          <a:xfrm>
+            <a:off x="8604539" y="2600102"/>
+            <a:ext cx="922240" cy="584775"/>
+          </a:xfrm>
+          <a:prstGeom prst="rect">
+            <a:avLst/>
+          </a:prstGeom>
+          <a:noFill/>
+        </p:spPr>
+        <p:txBody>
+          <a:bodyPr wrap="none" lIns="91440" tIns="45720" rIns="91440" bIns="45720">
+            <a:spAutoFit/>
+          </a:bodyPr>
+          <a:lstStyle/>
+          <a:p>
+            <a:pPr algn="just"/>
+            <a:r>
+              <a:rPr lang="en-US" sz="3200" dirty="0">
+                <a:ln w="0"/>
+                <a:solidFill>
+                  <a:schemeClr val="accent1"/>
+                </a:solidFill>
+                <a:effectLst>
+                  <a:outerShdw blurRad="38100" dist="25400" dir="5400000" algn="ctr" rotWithShape="0">
+                    <a:srgbClr val="6E747A">
+                      <a:alpha val="43000"/>
+                    </a:srgbClr>
+                  </a:outerShdw>
+                </a:effectLst>
+                <a:latin typeface="Calibri" panose="020F0502020204030204" pitchFamily="34" charset="0"/>
+                <a:cs typeface="Calibri" panose="020F0502020204030204" pitchFamily="34" charset="0"/>
+              </a:rPr>
+              <a:t>True</a:t>
+            </a:r>
+            <a:endParaRPr lang="en-US" sz="3200" b="0" cap="none" spc="0" dirty="0">
+              <a:ln w="0"/>
+              <a:solidFill>
+                <a:schemeClr val="accent1"/>
+              </a:solidFill>
+              <a:effectLst>
+                <a:outerShdw blurRad="38100" dist="25400" dir="5400000" algn="ctr" rotWithShape="0">
+                  <a:srgbClr val="6E747A">
+                    <a:alpha val="43000"/>
+                  </a:srgbClr>
+                </a:outerShdw>
+              </a:effectLst>
+              <a:latin typeface="Calibri" panose="020F0502020204030204" pitchFamily="34" charset="0"/>
+              <a:cs typeface="Calibri" panose="020F0502020204030204" pitchFamily="34" charset="0"/>
+            </a:endParaRPr>
+          </a:p>
+        </p:txBody>
+      </p:sp>
+      <p:cxnSp>
+        <p:nvCxnSpPr>
+          <p:cNvPr id="17" name="Straight Connector 16">
+            <a:extLst>
+              <a:ext uri="{FF2B5EF4-FFF2-40B4-BE49-F238E27FC236}">
+                <a16:creationId xmlns:a16="http://schemas.microsoft.com/office/drawing/2014/main" id="{AB13858E-7CB6-7A5F-20E3-2DAEC68F21CB}"/>
+              </a:ext>
+            </a:extLst>
+          </p:cNvPr>
+          <p:cNvCxnSpPr>
+            <a:cxnSpLocks/>
+          </p:cNvCxnSpPr>
+          <p:nvPr/>
+        </p:nvCxnSpPr>
+        <p:spPr>
+          <a:xfrm flipH="1">
+            <a:off x="7630693" y="2967335"/>
+            <a:ext cx="872605" cy="74445"/>
+          </a:xfrm>
+          <a:prstGeom prst="line">
+            <a:avLst/>
+          </a:prstGeom>
+          <a:ln w="76200">
+            <a:solidFill>
+              <a:schemeClr val="accent1">
+                <a:lumMod val="50000"/>
+              </a:schemeClr>
+            </a:solidFill>
+          </a:ln>
+        </p:spPr>
+        <p:style>
+          <a:lnRef idx="1">
+            <a:schemeClr val="accent1"/>
+          </a:lnRef>
+          <a:fillRef idx="0">
+            <a:schemeClr val="accent1"/>
+          </a:fillRef>
+          <a:effectRef idx="0">
+            <a:schemeClr val="accent1"/>
+          </a:effectRef>
+          <a:fontRef idx="minor">
+            <a:schemeClr val="tx1"/>
+          </a:fontRef>
+        </p:style>
+      </p:cxnSp>
     </p:spTree>
     <p:extLst>
       <p:ext uri="{BB962C8B-B14F-4D97-AF65-F5344CB8AC3E}">
@@ -10663,6 +12830,166 @@
   <p:clrMapOvr>
     <a:masterClrMapping/>
   </p:clrMapOvr>
+  <p:timing>
+    <p:tnLst>
+      <p:par>
+        <p:cTn id="1" dur="indefinite" restart="never" nodeType="tmRoot">
+          <p:childTnLst>
+            <p:seq concurrent="1" nextAc="seek">
+              <p:cTn id="2" dur="indefinite" nodeType="mainSeq">
+                <p:childTnLst>
+                  <p:par>
+                    <p:cTn id="3" fill="hold">
+                      <p:stCondLst>
+                        <p:cond delay="indefinite"/>
+                      </p:stCondLst>
+                      <p:childTnLst>
+                        <p:par>
+                          <p:cTn id="4" fill="hold">
+                            <p:stCondLst>
+                              <p:cond delay="0"/>
+                            </p:stCondLst>
+                            <p:childTnLst>
+                              <p:par>
+                                <p:cTn id="5" presetID="1" presetClass="entr" presetSubtype="0" fill="hold" grpId="0" nodeType="clickEffect">
+                                  <p:stCondLst>
+                                    <p:cond delay="0"/>
+                                  </p:stCondLst>
+                                  <p:childTnLst>
+                                    <p:set>
+                                      <p:cBhvr>
+                                        <p:cTn id="6" dur="1" fill="hold">
+                                          <p:stCondLst>
+                                            <p:cond delay="0"/>
+                                          </p:stCondLst>
+                                        </p:cTn>
+                                        <p:tgtEl>
+                                          <p:spTgt spid="7"/>
+                                        </p:tgtEl>
+                                        <p:attrNameLst>
+                                          <p:attrName>style.visibility</p:attrName>
+                                        </p:attrNameLst>
+                                      </p:cBhvr>
+                                      <p:to>
+                                        <p:strVal val="visible"/>
+                                      </p:to>
+                                    </p:set>
+                                  </p:childTnLst>
+                                </p:cTn>
+                              </p:par>
+                              <p:par>
+                                <p:cTn id="7" presetID="1" presetClass="entr" presetSubtype="0" fill="hold" grpId="0" nodeType="withEffect">
+                                  <p:stCondLst>
+                                    <p:cond delay="0"/>
+                                  </p:stCondLst>
+                                  <p:childTnLst>
+                                    <p:set>
+                                      <p:cBhvr>
+                                        <p:cTn id="8" dur="1" fill="hold">
+                                          <p:stCondLst>
+                                            <p:cond delay="0"/>
+                                          </p:stCondLst>
+                                        </p:cTn>
+                                        <p:tgtEl>
+                                          <p:spTgt spid="16"/>
+                                        </p:tgtEl>
+                                        <p:attrNameLst>
+                                          <p:attrName>style.visibility</p:attrName>
+                                        </p:attrNameLst>
+                                      </p:cBhvr>
+                                      <p:to>
+                                        <p:strVal val="visible"/>
+                                      </p:to>
+                                    </p:set>
+                                  </p:childTnLst>
+                                </p:cTn>
+                              </p:par>
+                              <p:par>
+                                <p:cTn id="9" presetID="1" presetClass="entr" presetSubtype="0" fill="hold" nodeType="withEffect">
+                                  <p:stCondLst>
+                                    <p:cond delay="0"/>
+                                  </p:stCondLst>
+                                  <p:childTnLst>
+                                    <p:set>
+                                      <p:cBhvr>
+                                        <p:cTn id="10" dur="1" fill="hold">
+                                          <p:stCondLst>
+                                            <p:cond delay="0"/>
+                                          </p:stCondLst>
+                                        </p:cTn>
+                                        <p:tgtEl>
+                                          <p:spTgt spid="17"/>
+                                        </p:tgtEl>
+                                        <p:attrNameLst>
+                                          <p:attrName>style.visibility</p:attrName>
+                                        </p:attrNameLst>
+                                      </p:cBhvr>
+                                      <p:to>
+                                        <p:strVal val="visible"/>
+                                      </p:to>
+                                    </p:set>
+                                  </p:childTnLst>
+                                </p:cTn>
+                              </p:par>
+                              <p:par>
+                                <p:cTn id="11" presetID="1" presetClass="entr" presetSubtype="0" fill="hold" nodeType="withEffect">
+                                  <p:stCondLst>
+                                    <p:cond delay="0"/>
+                                  </p:stCondLst>
+                                  <p:childTnLst>
+                                    <p:set>
+                                      <p:cBhvr>
+                                        <p:cTn id="12" dur="1" fill="hold">
+                                          <p:stCondLst>
+                                            <p:cond delay="0"/>
+                                          </p:stCondLst>
+                                        </p:cTn>
+                                        <p:tgtEl>
+                                          <p:spTgt spid="10"/>
+                                        </p:tgtEl>
+                                        <p:attrNameLst>
+                                          <p:attrName>style.visibility</p:attrName>
+                                        </p:attrNameLst>
+                                      </p:cBhvr>
+                                      <p:to>
+                                        <p:strVal val="visible"/>
+                                      </p:to>
+                                    </p:set>
+                                  </p:childTnLst>
+                                </p:cTn>
+                              </p:par>
+                            </p:childTnLst>
+                          </p:cTn>
+                        </p:par>
+                      </p:childTnLst>
+                    </p:cTn>
+                  </p:par>
+                </p:childTnLst>
+              </p:cTn>
+              <p:prevCondLst>
+                <p:cond evt="onPrev" delay="0">
+                  <p:tgtEl>
+                    <p:sldTgt/>
+                  </p:tgtEl>
+                </p:cond>
+              </p:prevCondLst>
+              <p:nextCondLst>
+                <p:cond evt="onNext" delay="0">
+                  <p:tgtEl>
+                    <p:sldTgt/>
+                  </p:tgtEl>
+                </p:cond>
+              </p:nextCondLst>
+            </p:seq>
+          </p:childTnLst>
+        </p:cTn>
+      </p:par>
+    </p:tnLst>
+    <p:bldLst>
+      <p:bldP spid="7" grpId="0"/>
+      <p:bldP spid="16" grpId="0"/>
+    </p:bldLst>
+  </p:timing>
 </p:sld>
 </file>
 
@@ -10745,8 +13072,8 @@
         </p:nvSpPr>
         <p:spPr>
           <a:xfrm>
-            <a:off x="5358180" y="106440"/>
-            <a:ext cx="1475660" cy="923330"/>
+            <a:off x="5687576" y="2505670"/>
+            <a:ext cx="1513556" cy="923330"/>
           </a:xfrm>
           <a:prstGeom prst="rect">
             <a:avLst/>
@@ -10773,8 +13100,10 @@
                     </a:schemeClr>
                   </a:outerShdw>
                 </a:effectLst>
+                <a:latin typeface="Calibri" panose="020F0502020204030204" pitchFamily="34" charset="0"/>
+                <a:cs typeface="Calibri" panose="020F0502020204030204" pitchFamily="34" charset="0"/>
               </a:rPr>
-              <a:t>Task</a:t>
+              <a:t>float</a:t>
             </a:r>
           </a:p>
         </p:txBody>
@@ -10827,6 +13156,446 @@
           </a:p>
         </p:txBody>
       </p:sp>
+      <p:sp>
+        <p:nvSpPr>
+          <p:cNvPr id="2" name="Rectangle 1">
+            <a:extLst>
+              <a:ext uri="{FF2B5EF4-FFF2-40B4-BE49-F238E27FC236}">
+                <a16:creationId xmlns:a16="http://schemas.microsoft.com/office/drawing/2014/main" id="{760F3FFA-4E6E-2649-F500-B3CD5C7E9A0F}"/>
+              </a:ext>
+            </a:extLst>
+          </p:cNvPr>
+          <p:cNvSpPr/>
+          <p:nvPr/>
+        </p:nvSpPr>
+        <p:spPr>
+          <a:xfrm>
+            <a:off x="3242166" y="2674947"/>
+            <a:ext cx="1539204" cy="584775"/>
+          </a:xfrm>
+          <a:prstGeom prst="rect">
+            <a:avLst/>
+          </a:prstGeom>
+          <a:noFill/>
+        </p:spPr>
+        <p:txBody>
+          <a:bodyPr wrap="none" lIns="91440" tIns="45720" rIns="91440" bIns="45720">
+            <a:spAutoFit/>
+          </a:bodyPr>
+          <a:lstStyle/>
+          <a:p>
+            <a:pPr algn="just"/>
+            <a:r>
+              <a:rPr lang="en-US" sz="3200" dirty="0">
+                <a:ln w="0"/>
+                <a:solidFill>
+                  <a:schemeClr val="accent1"/>
+                </a:solidFill>
+                <a:effectLst>
+                  <a:outerShdw blurRad="38100" dist="25400" dir="5400000" algn="ctr" rotWithShape="0">
+                    <a:srgbClr val="6E747A">
+                      <a:alpha val="43000"/>
+                    </a:srgbClr>
+                  </a:outerShdw>
+                </a:effectLst>
+                <a:latin typeface="Calibri" panose="020F0502020204030204" pitchFamily="34" charset="0"/>
+                <a:cs typeface="Calibri" panose="020F0502020204030204" pitchFamily="34" charset="0"/>
+              </a:rPr>
+              <a:t>0.11632</a:t>
+            </a:r>
+            <a:endParaRPr lang="en-US" sz="3200" b="0" cap="none" spc="0" dirty="0">
+              <a:ln w="0"/>
+              <a:solidFill>
+                <a:schemeClr val="accent1"/>
+              </a:solidFill>
+              <a:effectLst>
+                <a:outerShdw blurRad="38100" dist="25400" dir="5400000" algn="ctr" rotWithShape="0">
+                  <a:srgbClr val="6E747A">
+                    <a:alpha val="43000"/>
+                  </a:srgbClr>
+                </a:outerShdw>
+              </a:effectLst>
+              <a:latin typeface="Calibri" panose="020F0502020204030204" pitchFamily="34" charset="0"/>
+              <a:cs typeface="Calibri" panose="020F0502020204030204" pitchFamily="34" charset="0"/>
+            </a:endParaRPr>
+          </a:p>
+        </p:txBody>
+      </p:sp>
+      <p:sp>
+        <p:nvSpPr>
+          <p:cNvPr id="3" name="Rectangle 2">
+            <a:extLst>
+              <a:ext uri="{FF2B5EF4-FFF2-40B4-BE49-F238E27FC236}">
+                <a16:creationId xmlns:a16="http://schemas.microsoft.com/office/drawing/2014/main" id="{775F4F01-5855-3156-9F25-F7AEA9C5D5E4}"/>
+              </a:ext>
+            </a:extLst>
+          </p:cNvPr>
+          <p:cNvSpPr/>
+          <p:nvPr/>
+        </p:nvSpPr>
+        <p:spPr>
+          <a:xfrm>
+            <a:off x="6001032" y="1332193"/>
+            <a:ext cx="830677" cy="584775"/>
+          </a:xfrm>
+          <a:prstGeom prst="rect">
+            <a:avLst/>
+          </a:prstGeom>
+          <a:noFill/>
+        </p:spPr>
+        <p:txBody>
+          <a:bodyPr wrap="none" lIns="91440" tIns="45720" rIns="91440" bIns="45720">
+            <a:spAutoFit/>
+          </a:bodyPr>
+          <a:lstStyle/>
+          <a:p>
+            <a:pPr algn="just"/>
+            <a:r>
+              <a:rPr lang="en-US" sz="3200" dirty="0">
+                <a:ln w="0"/>
+                <a:solidFill>
+                  <a:schemeClr val="accent1"/>
+                </a:solidFill>
+                <a:effectLst>
+                  <a:outerShdw blurRad="38100" dist="25400" dir="5400000" algn="ctr" rotWithShape="0">
+                    <a:srgbClr val="6E747A">
+                      <a:alpha val="43000"/>
+                    </a:srgbClr>
+                  </a:outerShdw>
+                </a:effectLst>
+                <a:latin typeface="Calibri" panose="020F0502020204030204" pitchFamily="34" charset="0"/>
+                <a:cs typeface="Calibri" panose="020F0502020204030204" pitchFamily="34" charset="0"/>
+              </a:rPr>
+              <a:t>-0.1</a:t>
+            </a:r>
+            <a:endParaRPr lang="en-US" sz="3200" b="0" cap="none" spc="0" dirty="0">
+              <a:ln w="0"/>
+              <a:solidFill>
+                <a:schemeClr val="accent1"/>
+              </a:solidFill>
+              <a:effectLst>
+                <a:outerShdw blurRad="38100" dist="25400" dir="5400000" algn="ctr" rotWithShape="0">
+                  <a:srgbClr val="6E747A">
+                    <a:alpha val="43000"/>
+                  </a:srgbClr>
+                </a:outerShdw>
+              </a:effectLst>
+              <a:latin typeface="Calibri" panose="020F0502020204030204" pitchFamily="34" charset="0"/>
+              <a:cs typeface="Calibri" panose="020F0502020204030204" pitchFamily="34" charset="0"/>
+            </a:endParaRPr>
+          </a:p>
+        </p:txBody>
+      </p:sp>
+      <p:sp>
+        <p:nvSpPr>
+          <p:cNvPr id="6" name="Rectangle 5">
+            <a:extLst>
+              <a:ext uri="{FF2B5EF4-FFF2-40B4-BE49-F238E27FC236}">
+                <a16:creationId xmlns:a16="http://schemas.microsoft.com/office/drawing/2014/main" id="{33ECE4BC-40B2-1046-A284-C32546B0A0DF}"/>
+              </a:ext>
+            </a:extLst>
+          </p:cNvPr>
+          <p:cNvSpPr/>
+          <p:nvPr/>
+        </p:nvSpPr>
+        <p:spPr>
+          <a:xfrm>
+            <a:off x="8032646" y="2616304"/>
+            <a:ext cx="1247457" cy="584775"/>
+          </a:xfrm>
+          <a:prstGeom prst="rect">
+            <a:avLst/>
+          </a:prstGeom>
+          <a:noFill/>
+        </p:spPr>
+        <p:txBody>
+          <a:bodyPr wrap="none" lIns="91440" tIns="45720" rIns="91440" bIns="45720">
+            <a:spAutoFit/>
+          </a:bodyPr>
+          <a:lstStyle/>
+          <a:p>
+            <a:pPr algn="just"/>
+            <a:r>
+              <a:rPr lang="en-US" sz="3200" dirty="0">
+                <a:ln w="0"/>
+                <a:solidFill>
+                  <a:schemeClr val="accent1"/>
+                </a:solidFill>
+                <a:effectLst>
+                  <a:outerShdw blurRad="38100" dist="25400" dir="5400000" algn="ctr" rotWithShape="0">
+                    <a:srgbClr val="6E747A">
+                      <a:alpha val="43000"/>
+                    </a:srgbClr>
+                  </a:outerShdw>
+                </a:effectLst>
+                <a:latin typeface="Calibri" panose="020F0502020204030204" pitchFamily="34" charset="0"/>
+                <a:cs typeface="Calibri" panose="020F0502020204030204" pitchFamily="34" charset="0"/>
+              </a:rPr>
+              <a:t>-13.15</a:t>
+            </a:r>
+            <a:endParaRPr lang="en-US" sz="3200" b="0" cap="none" spc="0" dirty="0">
+              <a:ln w="0"/>
+              <a:solidFill>
+                <a:schemeClr val="accent1"/>
+              </a:solidFill>
+              <a:effectLst>
+                <a:outerShdw blurRad="38100" dist="25400" dir="5400000" algn="ctr" rotWithShape="0">
+                  <a:srgbClr val="6E747A">
+                    <a:alpha val="43000"/>
+                  </a:srgbClr>
+                </a:outerShdw>
+              </a:effectLst>
+              <a:latin typeface="Calibri" panose="020F0502020204030204" pitchFamily="34" charset="0"/>
+              <a:cs typeface="Calibri" panose="020F0502020204030204" pitchFamily="34" charset="0"/>
+            </a:endParaRPr>
+          </a:p>
+        </p:txBody>
+      </p:sp>
+      <p:sp>
+        <p:nvSpPr>
+          <p:cNvPr id="7" name="Rectangle 6">
+            <a:extLst>
+              <a:ext uri="{FF2B5EF4-FFF2-40B4-BE49-F238E27FC236}">
+                <a16:creationId xmlns:a16="http://schemas.microsoft.com/office/drawing/2014/main" id="{A5A5D896-B2EF-8B2B-F75B-A186CB5FF299}"/>
+              </a:ext>
+            </a:extLst>
+          </p:cNvPr>
+          <p:cNvSpPr/>
+          <p:nvPr/>
+        </p:nvSpPr>
+        <p:spPr>
+          <a:xfrm>
+            <a:off x="5707395" y="4192274"/>
+            <a:ext cx="1747594" cy="584775"/>
+          </a:xfrm>
+          <a:prstGeom prst="rect">
+            <a:avLst/>
+          </a:prstGeom>
+          <a:noFill/>
+        </p:spPr>
+        <p:txBody>
+          <a:bodyPr wrap="none" lIns="91440" tIns="45720" rIns="91440" bIns="45720">
+            <a:spAutoFit/>
+          </a:bodyPr>
+          <a:lstStyle/>
+          <a:p>
+            <a:pPr algn="just"/>
+            <a:r>
+              <a:rPr lang="en-US" sz="3200" dirty="0">
+                <a:ln w="0"/>
+                <a:solidFill>
+                  <a:schemeClr val="accent1"/>
+                </a:solidFill>
+                <a:effectLst>
+                  <a:outerShdw blurRad="38100" dist="25400" dir="5400000" algn="ctr" rotWithShape="0">
+                    <a:srgbClr val="6E747A">
+                      <a:alpha val="43000"/>
+                    </a:srgbClr>
+                  </a:outerShdw>
+                </a:effectLst>
+                <a:latin typeface="Calibri" panose="020F0502020204030204" pitchFamily="34" charset="0"/>
+                <a:cs typeface="Calibri" panose="020F0502020204030204" pitchFamily="34" charset="0"/>
+              </a:rPr>
+              <a:t>6937.394</a:t>
+            </a:r>
+            <a:endParaRPr lang="en-US" sz="3200" b="0" cap="none" spc="0" dirty="0">
+              <a:ln w="0"/>
+              <a:solidFill>
+                <a:schemeClr val="accent1"/>
+              </a:solidFill>
+              <a:effectLst>
+                <a:outerShdw blurRad="38100" dist="25400" dir="5400000" algn="ctr" rotWithShape="0">
+                  <a:srgbClr val="6E747A">
+                    <a:alpha val="43000"/>
+                  </a:srgbClr>
+                </a:outerShdw>
+              </a:effectLst>
+              <a:latin typeface="Calibri" panose="020F0502020204030204" pitchFamily="34" charset="0"/>
+              <a:cs typeface="Calibri" panose="020F0502020204030204" pitchFamily="34" charset="0"/>
+            </a:endParaRPr>
+          </a:p>
+        </p:txBody>
+      </p:sp>
+      <p:cxnSp>
+        <p:nvCxnSpPr>
+          <p:cNvPr id="9" name="Straight Connector 8">
+            <a:extLst>
+              <a:ext uri="{FF2B5EF4-FFF2-40B4-BE49-F238E27FC236}">
+                <a16:creationId xmlns:a16="http://schemas.microsoft.com/office/drawing/2014/main" id="{87E5FF71-58A7-E4CB-815F-719CF5467DBF}"/>
+              </a:ext>
+            </a:extLst>
+          </p:cNvPr>
+          <p:cNvCxnSpPr>
+            <a:cxnSpLocks/>
+          </p:cNvCxnSpPr>
+          <p:nvPr/>
+        </p:nvCxnSpPr>
+        <p:spPr>
+          <a:xfrm flipH="1">
+            <a:off x="4945224" y="2908692"/>
+            <a:ext cx="609600" cy="0"/>
+          </a:xfrm>
+          <a:prstGeom prst="line">
+            <a:avLst/>
+          </a:prstGeom>
+          <a:ln w="76200">
+            <a:solidFill>
+              <a:schemeClr val="accent1">
+                <a:lumMod val="50000"/>
+              </a:schemeClr>
+            </a:solidFill>
+          </a:ln>
+        </p:spPr>
+        <p:style>
+          <a:lnRef idx="1">
+            <a:schemeClr val="accent1"/>
+          </a:lnRef>
+          <a:fillRef idx="0">
+            <a:schemeClr val="accent1"/>
+          </a:fillRef>
+          <a:effectRef idx="0">
+            <a:schemeClr val="accent1"/>
+          </a:effectRef>
+          <a:fontRef idx="minor">
+            <a:schemeClr val="tx1"/>
+          </a:fontRef>
+        </p:style>
+      </p:cxnSp>
+      <p:cxnSp>
+        <p:nvCxnSpPr>
+          <p:cNvPr id="12" name="Straight Connector 11">
+            <a:extLst>
+              <a:ext uri="{FF2B5EF4-FFF2-40B4-BE49-F238E27FC236}">
+                <a16:creationId xmlns:a16="http://schemas.microsoft.com/office/drawing/2014/main" id="{0BBA34E7-DDBF-07D7-50F7-5E739B50CCA2}"/>
+              </a:ext>
+            </a:extLst>
+          </p:cNvPr>
+          <p:cNvCxnSpPr>
+            <a:cxnSpLocks/>
+          </p:cNvCxnSpPr>
+          <p:nvPr/>
+        </p:nvCxnSpPr>
+        <p:spPr>
+          <a:xfrm flipV="1">
+            <a:off x="6463014" y="3429000"/>
+            <a:ext cx="0" cy="608045"/>
+          </a:xfrm>
+          <a:prstGeom prst="line">
+            <a:avLst/>
+          </a:prstGeom>
+          <a:ln w="76200">
+            <a:solidFill>
+              <a:schemeClr val="accent1">
+                <a:lumMod val="50000"/>
+              </a:schemeClr>
+            </a:solidFill>
+          </a:ln>
+        </p:spPr>
+        <p:style>
+          <a:lnRef idx="1">
+            <a:schemeClr val="accent1"/>
+          </a:lnRef>
+          <a:fillRef idx="0">
+            <a:schemeClr val="accent1"/>
+          </a:fillRef>
+          <a:effectRef idx="0">
+            <a:schemeClr val="accent1"/>
+          </a:effectRef>
+          <a:fontRef idx="minor">
+            <a:schemeClr val="tx1"/>
+          </a:fontRef>
+        </p:style>
+      </p:cxnSp>
+      <p:cxnSp>
+        <p:nvCxnSpPr>
+          <p:cNvPr id="18" name="Straight Connector 17">
+            <a:extLst>
+              <a:ext uri="{FF2B5EF4-FFF2-40B4-BE49-F238E27FC236}">
+                <a16:creationId xmlns:a16="http://schemas.microsoft.com/office/drawing/2014/main" id="{B46F49F3-A691-EBA6-E104-5D27CB10D758}"/>
+              </a:ext>
+            </a:extLst>
+          </p:cNvPr>
+          <p:cNvCxnSpPr>
+            <a:cxnSpLocks/>
+          </p:cNvCxnSpPr>
+          <p:nvPr/>
+        </p:nvCxnSpPr>
+        <p:spPr>
+          <a:xfrm flipV="1">
+            <a:off x="6416371" y="1964094"/>
+            <a:ext cx="0" cy="608045"/>
+          </a:xfrm>
+          <a:prstGeom prst="line">
+            <a:avLst/>
+          </a:prstGeom>
+          <a:ln w="76200">
+            <a:solidFill>
+              <a:schemeClr val="accent1">
+                <a:lumMod val="50000"/>
+              </a:schemeClr>
+            </a:solidFill>
+          </a:ln>
+        </p:spPr>
+        <p:style>
+          <a:lnRef idx="1">
+            <a:schemeClr val="accent1"/>
+          </a:lnRef>
+          <a:fillRef idx="0">
+            <a:schemeClr val="accent1"/>
+          </a:fillRef>
+          <a:effectRef idx="0">
+            <a:schemeClr val="accent1"/>
+          </a:effectRef>
+          <a:fontRef idx="minor">
+            <a:schemeClr val="tx1"/>
+          </a:fontRef>
+        </p:style>
+      </p:cxnSp>
+      <p:cxnSp>
+        <p:nvCxnSpPr>
+          <p:cNvPr id="19" name="Straight Connector 18">
+            <a:extLst>
+              <a:ext uri="{FF2B5EF4-FFF2-40B4-BE49-F238E27FC236}">
+                <a16:creationId xmlns:a16="http://schemas.microsoft.com/office/drawing/2014/main" id="{CB3FE4AC-A87C-8123-D78F-645A1863732C}"/>
+              </a:ext>
+            </a:extLst>
+          </p:cNvPr>
+          <p:cNvCxnSpPr>
+            <a:cxnSpLocks/>
+          </p:cNvCxnSpPr>
+          <p:nvPr/>
+        </p:nvCxnSpPr>
+        <p:spPr>
+          <a:xfrm flipH="1">
+            <a:off x="7312089" y="2908692"/>
+            <a:ext cx="609600" cy="0"/>
+          </a:xfrm>
+          <a:prstGeom prst="line">
+            <a:avLst/>
+          </a:prstGeom>
+          <a:ln w="76200">
+            <a:solidFill>
+              <a:schemeClr val="accent1">
+                <a:lumMod val="50000"/>
+              </a:schemeClr>
+            </a:solidFill>
+          </a:ln>
+        </p:spPr>
+        <p:style>
+          <a:lnRef idx="1">
+            <a:schemeClr val="accent1"/>
+          </a:lnRef>
+          <a:fillRef idx="0">
+            <a:schemeClr val="accent1"/>
+          </a:fillRef>
+          <a:effectRef idx="0">
+            <a:schemeClr val="accent1"/>
+          </a:effectRef>
+          <a:fontRef idx="minor">
+            <a:schemeClr val="tx1"/>
+          </a:fontRef>
+        </p:style>
+      </p:cxnSp>
     </p:spTree>
     <p:extLst>
       <p:ext uri="{BB962C8B-B14F-4D97-AF65-F5344CB8AC3E}">
@@ -10837,6 +13606,303 @@
   <p:clrMapOvr>
     <a:masterClrMapping/>
   </p:clrMapOvr>
+  <p:timing>
+    <p:tnLst>
+      <p:par>
+        <p:cTn id="1" dur="indefinite" restart="never" nodeType="tmRoot">
+          <p:childTnLst>
+            <p:seq concurrent="1" nextAc="seek">
+              <p:cTn id="2" dur="indefinite" nodeType="mainSeq">
+                <p:childTnLst>
+                  <p:par>
+                    <p:cTn id="3" fill="hold">
+                      <p:stCondLst>
+                        <p:cond delay="indefinite"/>
+                      </p:stCondLst>
+                      <p:childTnLst>
+                        <p:par>
+                          <p:cTn id="4" fill="hold">
+                            <p:stCondLst>
+                              <p:cond delay="0"/>
+                            </p:stCondLst>
+                            <p:childTnLst>
+                              <p:par>
+                                <p:cTn id="5" presetID="1" presetClass="entr" presetSubtype="0" fill="hold" grpId="0" nodeType="clickEffect">
+                                  <p:stCondLst>
+                                    <p:cond delay="0"/>
+                                  </p:stCondLst>
+                                  <p:childTnLst>
+                                    <p:set>
+                                      <p:cBhvr>
+                                        <p:cTn id="6" dur="1" fill="hold">
+                                          <p:stCondLst>
+                                            <p:cond delay="0"/>
+                                          </p:stCondLst>
+                                        </p:cTn>
+                                        <p:tgtEl>
+                                          <p:spTgt spid="3"/>
+                                        </p:tgtEl>
+                                        <p:attrNameLst>
+                                          <p:attrName>style.visibility</p:attrName>
+                                        </p:attrNameLst>
+                                      </p:cBhvr>
+                                      <p:to>
+                                        <p:strVal val="visible"/>
+                                      </p:to>
+                                    </p:set>
+                                  </p:childTnLst>
+                                </p:cTn>
+                              </p:par>
+                            </p:childTnLst>
+                          </p:cTn>
+                        </p:par>
+                        <p:par>
+                          <p:cTn id="7" fill="hold">
+                            <p:stCondLst>
+                              <p:cond delay="0"/>
+                            </p:stCondLst>
+                            <p:childTnLst>
+                              <p:par>
+                                <p:cTn id="8" presetID="1" presetClass="entr" presetSubtype="0" fill="hold" grpId="0" nodeType="afterEffect">
+                                  <p:stCondLst>
+                                    <p:cond delay="0"/>
+                                  </p:stCondLst>
+                                  <p:childTnLst>
+                                    <p:set>
+                                      <p:cBhvr>
+                                        <p:cTn id="9" dur="1" fill="hold">
+                                          <p:stCondLst>
+                                            <p:cond delay="0"/>
+                                          </p:stCondLst>
+                                        </p:cTn>
+                                        <p:tgtEl>
+                                          <p:spTgt spid="2"/>
+                                        </p:tgtEl>
+                                        <p:attrNameLst>
+                                          <p:attrName>style.visibility</p:attrName>
+                                        </p:attrNameLst>
+                                      </p:cBhvr>
+                                      <p:to>
+                                        <p:strVal val="visible"/>
+                                      </p:to>
+                                    </p:set>
+                                  </p:childTnLst>
+                                </p:cTn>
+                              </p:par>
+                            </p:childTnLst>
+                          </p:cTn>
+                        </p:par>
+                        <p:par>
+                          <p:cTn id="10" fill="hold">
+                            <p:stCondLst>
+                              <p:cond delay="0"/>
+                            </p:stCondLst>
+                            <p:childTnLst>
+                              <p:par>
+                                <p:cTn id="11" presetID="1" presetClass="entr" presetSubtype="0" fill="hold" grpId="0" nodeType="afterEffect">
+                                  <p:stCondLst>
+                                    <p:cond delay="0"/>
+                                  </p:stCondLst>
+                                  <p:childTnLst>
+                                    <p:set>
+                                      <p:cBhvr>
+                                        <p:cTn id="12" dur="1" fill="hold">
+                                          <p:stCondLst>
+                                            <p:cond delay="0"/>
+                                          </p:stCondLst>
+                                        </p:cTn>
+                                        <p:tgtEl>
+                                          <p:spTgt spid="6"/>
+                                        </p:tgtEl>
+                                        <p:attrNameLst>
+                                          <p:attrName>style.visibility</p:attrName>
+                                        </p:attrNameLst>
+                                      </p:cBhvr>
+                                      <p:to>
+                                        <p:strVal val="visible"/>
+                                      </p:to>
+                                    </p:set>
+                                  </p:childTnLst>
+                                </p:cTn>
+                              </p:par>
+                            </p:childTnLst>
+                          </p:cTn>
+                        </p:par>
+                        <p:par>
+                          <p:cTn id="13" fill="hold">
+                            <p:stCondLst>
+                              <p:cond delay="0"/>
+                            </p:stCondLst>
+                            <p:childTnLst>
+                              <p:par>
+                                <p:cTn id="14" presetID="1" presetClass="entr" presetSubtype="0" fill="hold" grpId="0" nodeType="afterEffect">
+                                  <p:stCondLst>
+                                    <p:cond delay="0"/>
+                                  </p:stCondLst>
+                                  <p:childTnLst>
+                                    <p:set>
+                                      <p:cBhvr>
+                                        <p:cTn id="15" dur="1" fill="hold">
+                                          <p:stCondLst>
+                                            <p:cond delay="0"/>
+                                          </p:stCondLst>
+                                        </p:cTn>
+                                        <p:tgtEl>
+                                          <p:spTgt spid="7"/>
+                                        </p:tgtEl>
+                                        <p:attrNameLst>
+                                          <p:attrName>style.visibility</p:attrName>
+                                        </p:attrNameLst>
+                                      </p:cBhvr>
+                                      <p:to>
+                                        <p:strVal val="visible"/>
+                                      </p:to>
+                                    </p:set>
+                                  </p:childTnLst>
+                                </p:cTn>
+                              </p:par>
+                              <p:par>
+                                <p:cTn id="16" presetID="1" presetClass="entr" presetSubtype="0" fill="hold" nodeType="withEffect">
+                                  <p:stCondLst>
+                                    <p:cond delay="0"/>
+                                  </p:stCondLst>
+                                  <p:childTnLst>
+                                    <p:set>
+                                      <p:cBhvr>
+                                        <p:cTn id="17" dur="1" fill="hold">
+                                          <p:stCondLst>
+                                            <p:cond delay="0"/>
+                                          </p:stCondLst>
+                                        </p:cTn>
+                                        <p:tgtEl>
+                                          <p:spTgt spid="9"/>
+                                        </p:tgtEl>
+                                        <p:attrNameLst>
+                                          <p:attrName>style.visibility</p:attrName>
+                                        </p:attrNameLst>
+                                      </p:cBhvr>
+                                      <p:to>
+                                        <p:strVal val="visible"/>
+                                      </p:to>
+                                    </p:set>
+                                  </p:childTnLst>
+                                </p:cTn>
+                              </p:par>
+                              <p:par>
+                                <p:cTn id="18" presetID="1" presetClass="entr" presetSubtype="0" fill="hold" nodeType="withEffect">
+                                  <p:stCondLst>
+                                    <p:cond delay="0"/>
+                                  </p:stCondLst>
+                                  <p:childTnLst>
+                                    <p:set>
+                                      <p:cBhvr>
+                                        <p:cTn id="19" dur="1" fill="hold">
+                                          <p:stCondLst>
+                                            <p:cond delay="0"/>
+                                          </p:stCondLst>
+                                        </p:cTn>
+                                        <p:tgtEl>
+                                          <p:spTgt spid="12"/>
+                                        </p:tgtEl>
+                                        <p:attrNameLst>
+                                          <p:attrName>style.visibility</p:attrName>
+                                        </p:attrNameLst>
+                                      </p:cBhvr>
+                                      <p:to>
+                                        <p:strVal val="visible"/>
+                                      </p:to>
+                                    </p:set>
+                                  </p:childTnLst>
+                                </p:cTn>
+                              </p:par>
+                              <p:par>
+                                <p:cTn id="20" presetID="1" presetClass="entr" presetSubtype="0" fill="hold" nodeType="withEffect">
+                                  <p:stCondLst>
+                                    <p:cond delay="0"/>
+                                  </p:stCondLst>
+                                  <p:childTnLst>
+                                    <p:set>
+                                      <p:cBhvr>
+                                        <p:cTn id="21" dur="1" fill="hold">
+                                          <p:stCondLst>
+                                            <p:cond delay="0"/>
+                                          </p:stCondLst>
+                                        </p:cTn>
+                                        <p:tgtEl>
+                                          <p:spTgt spid="18"/>
+                                        </p:tgtEl>
+                                        <p:attrNameLst>
+                                          <p:attrName>style.visibility</p:attrName>
+                                        </p:attrNameLst>
+                                      </p:cBhvr>
+                                      <p:to>
+                                        <p:strVal val="visible"/>
+                                      </p:to>
+                                    </p:set>
+                                  </p:childTnLst>
+                                </p:cTn>
+                              </p:par>
+                              <p:par>
+                                <p:cTn id="22" presetID="1" presetClass="entr" presetSubtype="0" fill="hold" nodeType="withEffect">
+                                  <p:stCondLst>
+                                    <p:cond delay="0"/>
+                                  </p:stCondLst>
+                                  <p:childTnLst>
+                                    <p:set>
+                                      <p:cBhvr>
+                                        <p:cTn id="23" dur="1" fill="hold">
+                                          <p:stCondLst>
+                                            <p:cond delay="0"/>
+                                          </p:stCondLst>
+                                        </p:cTn>
+                                        <p:tgtEl>
+                                          <p:spTgt spid="19"/>
+                                        </p:tgtEl>
+                                        <p:attrNameLst>
+                                          <p:attrName>style.visibility</p:attrName>
+                                        </p:attrNameLst>
+                                      </p:cBhvr>
+                                      <p:to>
+                                        <p:strVal val="visible"/>
+                                      </p:to>
+                                    </p:set>
+                                  </p:childTnLst>
+                                </p:cTn>
+                              </p:par>
+                            </p:childTnLst>
+                          </p:cTn>
+                        </p:par>
+                      </p:childTnLst>
+                    </p:cTn>
+                  </p:par>
+                </p:childTnLst>
+              </p:cTn>
+              <p:prevCondLst>
+                <p:cond evt="onPrev" delay="0">
+                  <p:tgtEl>
+                    <p:sldTgt/>
+                  </p:tgtEl>
+                </p:cond>
+              </p:prevCondLst>
+              <p:nextCondLst>
+                <p:cond evt="onNext" delay="0">
+                  <p:tgtEl>
+                    <p:sldTgt/>
+                  </p:tgtEl>
+                </p:cond>
+              </p:nextCondLst>
+            </p:seq>
+          </p:childTnLst>
+        </p:cTn>
+      </p:par>
+    </p:tnLst>
+    <p:bldLst>
+      <p:bldP spid="2" grpId="0"/>
+      <p:bldP spid="3" grpId="0"/>
+      <p:bldP spid="6" grpId="0"/>
+      <p:bldP spid="7" grpId="0"/>
+    </p:bldLst>
+  </p:timing>
 </p:sld>
 </file>
 

</xml_diff>